<commit_message>
working on ppt and report
</commit_message>
<xml_diff>
--- a/docs/ectm_presentation.pptx
+++ b/docs/ectm_presentation.pptx
@@ -13370,91 +13370,147 @@
           <a:p>
             <a:pPr algn="ctr"/>
             <a:r>
-              <a:rPr lang="en-US" sz="1500" dirty="0" err="1"/>
+              <a:rPr lang="en-US" sz="1500" dirty="0" err="1">
+                <a:solidFill>
+                  <a:schemeClr val="bg1"/>
+                </a:solidFill>
+              </a:rPr>
               <a:t>Shreyas</a:t>
             </a:r>
             <a:r>
-              <a:rPr lang="en-US" sz="1500" dirty="0"/>
+              <a:rPr lang="en-US" sz="1500" dirty="0">
+                <a:solidFill>
+                  <a:schemeClr val="bg1"/>
+                </a:solidFill>
+              </a:rPr>
               <a:t> S</a:t>
             </a:r>
           </a:p>
           <a:p>
             <a:pPr algn="ctr"/>
             <a:r>
-              <a:rPr lang="en-US" sz="1500" dirty="0"/>
+              <a:rPr lang="en-US" sz="1500" dirty="0">
+                <a:solidFill>
+                  <a:schemeClr val="bg1"/>
+                </a:solidFill>
+              </a:rPr>
               <a:t>Machine Learning Intern</a:t>
             </a:r>
           </a:p>
           <a:p>
             <a:pPr algn="ctr"/>
             <a:r>
-              <a:rPr lang="en-US" sz="1500" dirty="0" err="1"/>
+              <a:rPr lang="en-US" sz="1500" dirty="0" err="1">
+                <a:solidFill>
+                  <a:schemeClr val="bg1"/>
+                </a:solidFill>
+              </a:rPr>
               <a:t>Faststream</a:t>
             </a:r>
             <a:r>
-              <a:rPr lang="en-US" sz="1500" dirty="0"/>
+              <a:rPr lang="en-US" sz="1500" dirty="0">
+                <a:solidFill>
+                  <a:schemeClr val="bg1"/>
+                </a:solidFill>
+              </a:rPr>
               <a:t> Technologies</a:t>
             </a:r>
           </a:p>
           <a:p>
             <a:pPr algn="ctr"/>
             <a:r>
-              <a:rPr lang="en-US" sz="1500" dirty="0"/>
+              <a:rPr lang="en-US" sz="1500" dirty="0">
+                <a:solidFill>
+                  <a:schemeClr val="bg1"/>
+                </a:solidFill>
+              </a:rPr>
               <a:t>		     												Vinay Bansal</a:t>
             </a:r>
           </a:p>
           <a:p>
             <a:pPr algn="ctr"/>
             <a:r>
-              <a:rPr lang="en-US" sz="1500"/>
-              <a:t>	Chief </a:t>
-            </a:r>
-            <a:r>
-              <a:rPr lang="en-US" sz="1500" dirty="0"/>
-              <a:t>Executive Officer</a:t>
+              <a:rPr lang="en-US" sz="1500" dirty="0">
+                <a:solidFill>
+                  <a:schemeClr val="bg1"/>
+                </a:solidFill>
+              </a:rPr>
+              <a:t>	Chief Executive Officer</a:t>
             </a:r>
           </a:p>
           <a:p>
             <a:pPr algn="ctr"/>
             <a:r>
-              <a:rPr lang="en-US" sz="1500" dirty="0"/>
+              <a:rPr lang="en-US" sz="1500" dirty="0">
+                <a:solidFill>
+                  <a:schemeClr val="bg1"/>
+                </a:solidFill>
+              </a:rPr>
               <a:t>	</a:t>
             </a:r>
             <a:r>
-              <a:rPr lang="en-US" sz="1500" dirty="0" err="1"/>
+              <a:rPr lang="en-US" sz="1500" dirty="0" err="1">
+                <a:solidFill>
+                  <a:schemeClr val="bg1"/>
+                </a:solidFill>
+              </a:rPr>
               <a:t>Faststream</a:t>
             </a:r>
             <a:r>
-              <a:rPr lang="en-US" sz="1500" dirty="0"/>
+              <a:rPr lang="en-US" sz="1500" dirty="0">
+                <a:solidFill>
+                  <a:schemeClr val="bg1"/>
+                </a:solidFill>
+              </a:rPr>
               <a:t> Technologies</a:t>
             </a:r>
           </a:p>
           <a:p>
             <a:pPr algn="ctr"/>
             <a:r>
-              <a:rPr lang="en-US" sz="1500" dirty="0"/>
+              <a:rPr lang="en-US" sz="1500" dirty="0">
+                <a:solidFill>
+                  <a:schemeClr val="bg1"/>
+                </a:solidFill>
+              </a:rPr>
               <a:t>				     										Vinod Agrawal</a:t>
             </a:r>
           </a:p>
           <a:p>
             <a:pPr algn="ctr"/>
             <a:r>
-              <a:rPr lang="en-US" sz="1500" dirty="0"/>
+              <a:rPr lang="en-US" sz="1500" dirty="0">
+                <a:solidFill>
+                  <a:schemeClr val="bg1"/>
+                </a:solidFill>
+              </a:rPr>
               <a:t>      Chief Technology 	Officer</a:t>
             </a:r>
           </a:p>
           <a:p>
             <a:pPr algn="ctr"/>
             <a:r>
-              <a:rPr lang="en-US" sz="1500" dirty="0"/>
+              <a:rPr lang="en-US" sz="1500" dirty="0">
+                <a:solidFill>
+                  <a:schemeClr val="bg1"/>
+                </a:solidFill>
+              </a:rPr>
               <a:t>	</a:t>
             </a:r>
             <a:r>
-              <a:rPr lang="en-US" sz="1500" dirty="0" err="1"/>
+              <a:rPr lang="en-US" sz="1500" dirty="0" err="1">
+                <a:solidFill>
+                  <a:schemeClr val="bg1"/>
+                </a:solidFill>
+              </a:rPr>
               <a:t>Faststream</a:t>
             </a:r>
             <a:r>
-              <a:rPr lang="en-US" sz="1500" dirty="0"/>
+              <a:rPr lang="en-US" sz="1500" dirty="0">
+                <a:solidFill>
+                  <a:schemeClr val="bg1"/>
+                </a:solidFill>
+              </a:rPr>
               <a:t> Technologies</a:t>
             </a:r>
           </a:p>
@@ -13844,28 +13900,19 @@
           </a:bodyPr>
           <a:lstStyle/>
           <a:p>
+            <a:endParaRPr lang="en-US" sz="2000" dirty="0"/>
+          </a:p>
+          <a:p>
+            <a:endParaRPr lang="en-US" sz="2000" dirty="0"/>
+          </a:p>
+          <a:p>
             <a:r>
               <a:rPr lang="en-US" sz="2000" dirty="0"/>
-              <a:t>To predict the probability of failure of an aircraft engine based on 5 parameters</a:t>
+              <a:t>To predict the probability of failure of an aircraft engine based on five parameters using three machine learning algorithms and comparing the performances of each algorithm</a:t>
             </a:r>
           </a:p>
           <a:p>
             <a:endParaRPr lang="en-US" sz="2000" dirty="0"/>
-          </a:p>
-          <a:p>
-            <a:r>
-              <a:rPr lang="en-US" sz="2000" dirty="0"/>
-              <a:t>The probability of failure is detected using Machine Learning algorithms</a:t>
-            </a:r>
-          </a:p>
-          <a:p>
-            <a:endParaRPr lang="en-US" sz="2000" dirty="0"/>
-          </a:p>
-          <a:p>
-            <a:r>
-              <a:rPr lang="en-US" sz="2000" dirty="0"/>
-              <a:t>Performances of three different machine learning algorithms are measured</a:t>
-            </a:r>
           </a:p>
           <a:p>
             <a:endParaRPr lang="en-US" sz="2000" dirty="0"/>
@@ -13955,7 +14002,7 @@
           <a:p>
             <a:r>
               <a:rPr lang="en-US" sz="2000" dirty="0"/>
-              <a:t>Aircraft engine failure constitutes multiple reasons such as mechanical problems in the engine, oil leaks, fuel pump problems etc.</a:t>
+              <a:t>Aircraft engine failure constitutes multiple reasons such as noise from the fan blade, exhaust gas temperature of turbine, fuel flow of turbine, low pressure fan speed, high pressure rotor speed, mechanical problems in the engine, oil leaks, fuel pump problems etc.</a:t>
             </a:r>
           </a:p>
           <a:p>
@@ -13964,7 +14011,7 @@
           <a:p>
             <a:r>
               <a:rPr lang="en-US" sz="2000" dirty="0"/>
-              <a:t>We have considered five components – Fan Blade Noise, Exhaust Gas Temperature of Turbine, Fuel Flow of Turbine, Low Pressure Fan Speed and High Pressure Fan Speed</a:t>
+              <a:t>We have considered five components – Fan Blade Noise, Exhaust Gas Temperature of Turbine, Fuel Flow of Turbine, Low Pressure Fan Speed and High Pressure Rotor Speed</a:t>
             </a:r>
           </a:p>
         </p:txBody>
@@ -14052,7 +14099,7 @@
           <a:p>
             <a:r>
               <a:rPr lang="en-US" sz="2000" dirty="0"/>
-              <a:t>In the absence of available data, data has been generated based on base value and random degradation</a:t>
+              <a:t>Data, in the absence of its availability, has been generated based on nominal value and random degradation</a:t>
             </a:r>
           </a:p>
           <a:p>

</xml_diff>

<commit_message>
finished report and ppt
</commit_message>
<xml_diff>
--- a/docs/ectm_presentation.pptx
+++ b/docs/ectm_presentation.pptx
@@ -11,12 +11,18 @@
     <p:sldId id="265" r:id="rId5"/>
     <p:sldId id="266" r:id="rId6"/>
     <p:sldId id="267" r:id="rId7"/>
-    <p:sldId id="259" r:id="rId8"/>
-    <p:sldId id="260" r:id="rId9"/>
-    <p:sldId id="262" r:id="rId10"/>
-    <p:sldId id="263" r:id="rId11"/>
-    <p:sldId id="268" r:id="rId12"/>
-    <p:sldId id="269" r:id="rId13"/>
+    <p:sldId id="270" r:id="rId8"/>
+    <p:sldId id="271" r:id="rId9"/>
+    <p:sldId id="272" r:id="rId10"/>
+    <p:sldId id="259" r:id="rId11"/>
+    <p:sldId id="260" r:id="rId12"/>
+    <p:sldId id="262" r:id="rId13"/>
+    <p:sldId id="263" r:id="rId14"/>
+    <p:sldId id="268" r:id="rId15"/>
+    <p:sldId id="269" r:id="rId16"/>
+    <p:sldId id="273" r:id="rId17"/>
+    <p:sldId id="274" r:id="rId18"/>
+    <p:sldId id="275" r:id="rId19"/>
   </p:sldIdLst>
   <p:sldSz cx="12192000" cy="6858000"/>
   <p:notesSz cx="6858000" cy="9144000"/>
@@ -13341,7 +13347,7 @@
             </a:br>
             <a:r>
               <a:rPr lang="en-US" sz="3300" b="1" dirty="0"/>
-              <a:t>Predicting the failure of aircraft engines</a:t>
+              <a:t>Failure prediction of aircraft engines</a:t>
             </a:r>
           </a:p>
         </p:txBody>
@@ -13558,6 +13564,317 @@
         </p:nvSpPr>
         <p:spPr/>
         <p:txBody>
+          <a:bodyPr>
+            <a:normAutofit fontScale="90000"/>
+          </a:bodyPr>
+          <a:lstStyle/>
+          <a:p>
+            <a:r>
+              <a:rPr lang="en-US" b="1" dirty="0"/>
+              <a:t>SAMPLE DATA (under normal conditions)</a:t>
+            </a:r>
+          </a:p>
+        </p:txBody>
+      </p:sp>
+      <p:sp>
+        <p:nvSpPr>
+          <p:cNvPr id="7" name="Content Placeholder 6"/>
+          <p:cNvSpPr>
+            <a:spLocks noGrp="1"/>
+          </p:cNvSpPr>
+          <p:nvPr>
+            <p:ph idx="1"/>
+          </p:nvPr>
+        </p:nvSpPr>
+        <p:spPr/>
+        <p:txBody>
+          <a:bodyPr/>
+          <a:lstStyle/>
+          <a:p>
+            <a:endParaRPr lang="en-US" dirty="0"/>
+          </a:p>
+        </p:txBody>
+      </p:sp>
+      <p:pic>
+        <p:nvPicPr>
+          <p:cNvPr id="4" name="Picture 3">
+            <a:extLst>
+              <a:ext uri="{FF2B5EF4-FFF2-40B4-BE49-F238E27FC236}">
+                <a16:creationId xmlns:a16="http://schemas.microsoft.com/office/drawing/2014/main" id="{0FC6717A-E835-F048-8594-C4004A32DF4B}"/>
+              </a:ext>
+            </a:extLst>
+          </p:cNvPr>
+          <p:cNvPicPr>
+            <a:picLocks noChangeAspect="1"/>
+          </p:cNvPicPr>
+          <p:nvPr/>
+        </p:nvPicPr>
+        <p:blipFill>
+          <a:blip r:embed="rId2"/>
+          <a:stretch>
+            <a:fillRect/>
+          </a:stretch>
+        </p:blipFill>
+        <p:spPr>
+          <a:xfrm>
+            <a:off x="1049850" y="2422609"/>
+            <a:ext cx="10070094" cy="3778081"/>
+          </a:xfrm>
+          <a:prstGeom prst="rect">
+            <a:avLst/>
+          </a:prstGeom>
+        </p:spPr>
+      </p:pic>
+    </p:spTree>
+    <p:extLst>
+      <p:ext uri="{BB962C8B-B14F-4D97-AF65-F5344CB8AC3E}">
+        <p14:creationId xmlns:p14="http://schemas.microsoft.com/office/powerpoint/2010/main" val="1501488235"/>
+      </p:ext>
+    </p:extLst>
+  </p:cSld>
+  <p:clrMapOvr>
+    <a:masterClrMapping/>
+  </p:clrMapOvr>
+</p:sld>
+</file>
+
+<file path=ppt/slides/slide11.xml><?xml version="1.0" encoding="utf-8"?>
+<p:sld xmlns:a="http://schemas.openxmlformats.org/drawingml/2006/main" xmlns:r="http://schemas.openxmlformats.org/officeDocument/2006/relationships" xmlns:p="http://schemas.openxmlformats.org/presentationml/2006/main">
+  <p:cSld>
+    <p:spTree>
+      <p:nvGrpSpPr>
+        <p:cNvPr id="1" name=""/>
+        <p:cNvGrpSpPr/>
+        <p:nvPr/>
+      </p:nvGrpSpPr>
+      <p:grpSpPr>
+        <a:xfrm>
+          <a:off x="0" y="0"/>
+          <a:ext cx="0" cy="0"/>
+          <a:chOff x="0" y="0"/>
+          <a:chExt cx="0" cy="0"/>
+        </a:xfrm>
+      </p:grpSpPr>
+      <p:sp>
+        <p:nvSpPr>
+          <p:cNvPr id="2" name="Title 1"/>
+          <p:cNvSpPr>
+            <a:spLocks noGrp="1"/>
+          </p:cNvSpPr>
+          <p:nvPr>
+            <p:ph type="title"/>
+          </p:nvPr>
+        </p:nvSpPr>
+        <p:spPr/>
+        <p:txBody>
+          <a:bodyPr/>
+          <a:lstStyle/>
+          <a:p>
+            <a:r>
+              <a:rPr lang="en-US" b="1" dirty="0"/>
+              <a:t>SAMPLE DATA (with random degradation)</a:t>
+            </a:r>
+          </a:p>
+        </p:txBody>
+      </p:sp>
+      <p:sp>
+        <p:nvSpPr>
+          <p:cNvPr id="5" name="Content Placeholder 4"/>
+          <p:cNvSpPr>
+            <a:spLocks noGrp="1"/>
+          </p:cNvSpPr>
+          <p:nvPr>
+            <p:ph idx="1"/>
+          </p:nvPr>
+        </p:nvSpPr>
+        <p:spPr/>
+        <p:txBody>
+          <a:bodyPr/>
+          <a:lstStyle/>
+          <a:p>
+            <a:endParaRPr lang="en-US" dirty="0"/>
+          </a:p>
+        </p:txBody>
+      </p:sp>
+      <p:pic>
+        <p:nvPicPr>
+          <p:cNvPr id="3" name="Picture 2">
+            <a:extLst>
+              <a:ext uri="{FF2B5EF4-FFF2-40B4-BE49-F238E27FC236}">
+                <a16:creationId xmlns:a16="http://schemas.microsoft.com/office/drawing/2014/main" id="{F1AC9083-FEBC-8247-8C0A-BA0E2EC27611}"/>
+              </a:ext>
+            </a:extLst>
+          </p:cNvPr>
+          <p:cNvPicPr>
+            <a:picLocks noChangeAspect="1"/>
+          </p:cNvPicPr>
+          <p:nvPr/>
+        </p:nvPicPr>
+        <p:blipFill>
+          <a:blip r:embed="rId2"/>
+          <a:stretch>
+            <a:fillRect/>
+          </a:stretch>
+        </p:blipFill>
+        <p:spPr>
+          <a:xfrm>
+            <a:off x="1091033" y="2496645"/>
+            <a:ext cx="10028912" cy="3783958"/>
+          </a:xfrm>
+          <a:prstGeom prst="rect">
+            <a:avLst/>
+          </a:prstGeom>
+        </p:spPr>
+      </p:pic>
+    </p:spTree>
+    <p:extLst>
+      <p:ext uri="{BB962C8B-B14F-4D97-AF65-F5344CB8AC3E}">
+        <p14:creationId xmlns:p14="http://schemas.microsoft.com/office/powerpoint/2010/main" val="724238803"/>
+      </p:ext>
+    </p:extLst>
+  </p:cSld>
+  <p:clrMapOvr>
+    <a:masterClrMapping/>
+  </p:clrMapOvr>
+</p:sld>
+</file>
+
+<file path=ppt/slides/slide12.xml><?xml version="1.0" encoding="utf-8"?>
+<p:sld xmlns:a="http://schemas.openxmlformats.org/drawingml/2006/main" xmlns:r="http://schemas.openxmlformats.org/officeDocument/2006/relationships" xmlns:p="http://schemas.openxmlformats.org/presentationml/2006/main">
+  <p:cSld>
+    <p:spTree>
+      <p:nvGrpSpPr>
+        <p:cNvPr id="1" name=""/>
+        <p:cNvGrpSpPr/>
+        <p:nvPr/>
+      </p:nvGrpSpPr>
+      <p:grpSpPr>
+        <a:xfrm>
+          <a:off x="0" y="0"/>
+          <a:ext cx="0" cy="0"/>
+          <a:chOff x="0" y="0"/>
+          <a:chExt cx="0" cy="0"/>
+        </a:xfrm>
+      </p:grpSpPr>
+      <p:sp>
+        <p:nvSpPr>
+          <p:cNvPr id="2" name="Title 1"/>
+          <p:cNvSpPr>
+            <a:spLocks noGrp="1"/>
+          </p:cNvSpPr>
+          <p:nvPr>
+            <p:ph type="title"/>
+          </p:nvPr>
+        </p:nvSpPr>
+        <p:spPr/>
+        <p:txBody>
+          <a:bodyPr/>
+          <a:lstStyle/>
+          <a:p>
+            <a:r>
+              <a:rPr lang="en-US" b="1" dirty="0"/>
+              <a:t>RESULTS (Multiple Linear Regression)</a:t>
+            </a:r>
+          </a:p>
+        </p:txBody>
+      </p:sp>
+      <p:sp>
+        <p:nvSpPr>
+          <p:cNvPr id="9" name="Content Placeholder 8">
+            <a:extLst>
+              <a:ext uri="{FF2B5EF4-FFF2-40B4-BE49-F238E27FC236}">
+                <a16:creationId xmlns:a16="http://schemas.microsoft.com/office/drawing/2014/main" id="{99109DF5-D3FB-C442-87A3-69151362FE4F}"/>
+              </a:ext>
+            </a:extLst>
+          </p:cNvPr>
+          <p:cNvSpPr>
+            <a:spLocks noGrp="1"/>
+          </p:cNvSpPr>
+          <p:nvPr>
+            <p:ph idx="1"/>
+          </p:nvPr>
+        </p:nvSpPr>
+        <p:spPr/>
+        <p:txBody>
+          <a:bodyPr/>
+          <a:lstStyle/>
+          <a:p>
+            <a:endParaRPr lang="en-US" dirty="0"/>
+          </a:p>
+        </p:txBody>
+      </p:sp>
+      <p:pic>
+        <p:nvPicPr>
+          <p:cNvPr id="10" name="Picture 9">
+            <a:extLst>
+              <a:ext uri="{FF2B5EF4-FFF2-40B4-BE49-F238E27FC236}">
+                <a16:creationId xmlns:a16="http://schemas.microsoft.com/office/drawing/2014/main" id="{19D14794-8909-6346-BE89-B735451CD721}"/>
+              </a:ext>
+            </a:extLst>
+          </p:cNvPr>
+          <p:cNvPicPr>
+            <a:picLocks noChangeAspect="1"/>
+          </p:cNvPicPr>
+          <p:nvPr/>
+        </p:nvPicPr>
+        <p:blipFill>
+          <a:blip r:embed="rId2"/>
+          <a:stretch>
+            <a:fillRect/>
+          </a:stretch>
+        </p:blipFill>
+        <p:spPr>
+          <a:xfrm>
+            <a:off x="2118567" y="2257316"/>
+            <a:ext cx="7797800" cy="4508500"/>
+          </a:xfrm>
+          <a:prstGeom prst="rect">
+            <a:avLst/>
+          </a:prstGeom>
+        </p:spPr>
+      </p:pic>
+    </p:spTree>
+    <p:extLst>
+      <p:ext uri="{BB962C8B-B14F-4D97-AF65-F5344CB8AC3E}">
+        <p14:creationId xmlns:p14="http://schemas.microsoft.com/office/powerpoint/2010/main" val="800801358"/>
+      </p:ext>
+    </p:extLst>
+  </p:cSld>
+  <p:clrMapOvr>
+    <a:masterClrMapping/>
+  </p:clrMapOvr>
+</p:sld>
+</file>
+
+<file path=ppt/slides/slide13.xml><?xml version="1.0" encoding="utf-8"?>
+<p:sld xmlns:a="http://schemas.openxmlformats.org/drawingml/2006/main" xmlns:r="http://schemas.openxmlformats.org/officeDocument/2006/relationships" xmlns:p="http://schemas.openxmlformats.org/presentationml/2006/main">
+  <p:cSld>
+    <p:spTree>
+      <p:nvGrpSpPr>
+        <p:cNvPr id="1" name=""/>
+        <p:cNvGrpSpPr/>
+        <p:nvPr/>
+      </p:nvGrpSpPr>
+      <p:grpSpPr>
+        <a:xfrm>
+          <a:off x="0" y="0"/>
+          <a:ext cx="0" cy="0"/>
+          <a:chOff x="0" y="0"/>
+          <a:chExt cx="0" cy="0"/>
+        </a:xfrm>
+      </p:grpSpPr>
+      <p:sp>
+        <p:nvSpPr>
+          <p:cNvPr id="2" name="Title 1"/>
+          <p:cNvSpPr>
+            <a:spLocks noGrp="1"/>
+          </p:cNvSpPr>
+          <p:nvPr>
+            <p:ph type="title"/>
+          </p:nvPr>
+        </p:nvSpPr>
+        <p:spPr/>
+        <p:txBody>
           <a:bodyPr/>
           <a:lstStyle/>
           <a:p>
@@ -13589,7 +13906,10 @@
           <a:bodyPr/>
           <a:lstStyle/>
           <a:p>
-            <a:endParaRPr lang="en-US"/>
+            <a:pPr marL="0" indent="0">
+              <a:buNone/>
+            </a:pPr>
+            <a:endParaRPr lang="en-US" dirty="0"/>
           </a:p>
         </p:txBody>
       </p:sp>
@@ -13636,7 +13956,7 @@
 </p:sld>
 </file>
 
-<file path=ppt/slides/slide11.xml><?xml version="1.0" encoding="utf-8"?>
+<file path=ppt/slides/slide14.xml><?xml version="1.0" encoding="utf-8"?>
 <p:sld xmlns:a="http://schemas.openxmlformats.org/drawingml/2006/main" xmlns:r="http://schemas.openxmlformats.org/officeDocument/2006/relationships" xmlns:p="http://schemas.openxmlformats.org/presentationml/2006/main">
   <p:cSld>
     <p:spTree>
@@ -13749,7 +14069,7 @@
 </p:sld>
 </file>
 
-<file path=ppt/slides/slide12.xml><?xml version="1.0" encoding="utf-8"?>
+<file path=ppt/slides/slide15.xml><?xml version="1.0" encoding="utf-8"?>
 <p:sld xmlns:a="http://schemas.openxmlformats.org/drawingml/2006/main" xmlns:r="http://schemas.openxmlformats.org/officeDocument/2006/relationships" xmlns:p="http://schemas.openxmlformats.org/presentationml/2006/main">
   <p:cSld>
     <p:spTree>
@@ -13789,8 +14109,197 @@
           <a:p>
             <a:r>
               <a:rPr lang="en-US" b="1" dirty="0"/>
-              <a:t>Final Result Comparison (R2 Score)</a:t>
-            </a:r>
+              <a:t>Final Result Comparison</a:t>
+            </a:r>
+          </a:p>
+        </p:txBody>
+      </p:sp>
+      <p:sp>
+        <p:nvSpPr>
+          <p:cNvPr id="5" name="Content Placeholder 4">
+            <a:extLst>
+              <a:ext uri="{FF2B5EF4-FFF2-40B4-BE49-F238E27FC236}">
+                <a16:creationId xmlns:a16="http://schemas.microsoft.com/office/drawing/2014/main" id="{67829A18-9E89-6B4E-AED9-07ED0727AA19}"/>
+              </a:ext>
+            </a:extLst>
+          </p:cNvPr>
+          <p:cNvSpPr>
+            <a:spLocks noGrp="1"/>
+          </p:cNvSpPr>
+          <p:nvPr>
+            <p:ph idx="1"/>
+          </p:nvPr>
+        </p:nvSpPr>
+        <p:spPr/>
+        <p:txBody>
+          <a:bodyPr>
+            <a:normAutofit fontScale="85000" lnSpcReduction="10000"/>
+          </a:bodyPr>
+          <a:lstStyle/>
+          <a:p>
+            <a:r>
+              <a:rPr lang="en-US" dirty="0"/>
+              <a:t>In a real world scenario, we would compare the predicted value to the real world value and then compute the accuracy of each algorithm.</a:t>
+            </a:r>
+          </a:p>
+          <a:p>
+            <a:endParaRPr lang="en-US" dirty="0"/>
+          </a:p>
+          <a:p>
+            <a:r>
+              <a:rPr lang="en-US" dirty="0"/>
+              <a:t>Due to the absence of real world data, the results of all the three algorithms are compared using R</a:t>
+            </a:r>
+            <a:r>
+              <a:rPr lang="en-US" baseline="30000" dirty="0"/>
+              <a:t>2</a:t>
+            </a:r>
+            <a:r>
+              <a:rPr lang="en-US" dirty="0"/>
+              <a:t> Score.</a:t>
+            </a:r>
+          </a:p>
+          <a:p>
+            <a:endParaRPr lang="en-US" dirty="0"/>
+          </a:p>
+          <a:p>
+            <a:r>
+              <a:rPr lang="en-US" dirty="0"/>
+              <a:t>R</a:t>
+            </a:r>
+            <a:r>
+              <a:rPr lang="en-US" baseline="30000" dirty="0"/>
+              <a:t>2</a:t>
+            </a:r>
+            <a:r>
+              <a:rPr lang="en-US" dirty="0"/>
+              <a:t> Score is a statistical measure of how close the data are to the fitted regression line.</a:t>
+            </a:r>
+          </a:p>
+          <a:p>
+            <a:endParaRPr lang="en-US" dirty="0"/>
+          </a:p>
+          <a:p>
+            <a:r>
+              <a:rPr lang="en-US" dirty="0"/>
+              <a:t>R</a:t>
+            </a:r>
+            <a:r>
+              <a:rPr lang="en-US" baseline="30000" dirty="0"/>
+              <a:t>2</a:t>
+            </a:r>
+            <a:r>
+              <a:rPr lang="en-US" dirty="0"/>
+              <a:t> = Explained Variation/Total Variation</a:t>
+            </a:r>
+          </a:p>
+          <a:p>
+            <a:endParaRPr lang="en-US" dirty="0"/>
+          </a:p>
+          <a:p>
+            <a:r>
+              <a:rPr lang="en-US" dirty="0"/>
+              <a:t>R</a:t>
+            </a:r>
+            <a:r>
+              <a:rPr lang="en-US" baseline="30000" dirty="0"/>
+              <a:t>2</a:t>
+            </a:r>
+            <a:r>
+              <a:rPr lang="en-US" dirty="0"/>
+              <a:t> is always between 0 and 1, 0 being the least and 1 being the highest.</a:t>
+            </a:r>
+          </a:p>
+        </p:txBody>
+      </p:sp>
+    </p:spTree>
+    <p:extLst>
+      <p:ext uri="{BB962C8B-B14F-4D97-AF65-F5344CB8AC3E}">
+        <p14:creationId xmlns:p14="http://schemas.microsoft.com/office/powerpoint/2010/main" val="1934809408"/>
+      </p:ext>
+    </p:extLst>
+  </p:cSld>
+  <p:clrMapOvr>
+    <a:masterClrMapping/>
+  </p:clrMapOvr>
+</p:sld>
+</file>
+
+<file path=ppt/slides/slide16.xml><?xml version="1.0" encoding="utf-8"?>
+<p:sld xmlns:a="http://schemas.openxmlformats.org/drawingml/2006/main" xmlns:r="http://schemas.openxmlformats.org/officeDocument/2006/relationships" xmlns:p="http://schemas.openxmlformats.org/presentationml/2006/main">
+  <p:cSld>
+    <p:spTree>
+      <p:nvGrpSpPr>
+        <p:cNvPr id="1" name=""/>
+        <p:cNvGrpSpPr/>
+        <p:nvPr/>
+      </p:nvGrpSpPr>
+      <p:grpSpPr>
+        <a:xfrm>
+          <a:off x="0" y="0"/>
+          <a:ext cx="0" cy="0"/>
+          <a:chOff x="0" y="0"/>
+          <a:chExt cx="0" cy="0"/>
+        </a:xfrm>
+      </p:grpSpPr>
+      <p:sp>
+        <p:nvSpPr>
+          <p:cNvPr id="2" name="Title 1">
+            <a:extLst>
+              <a:ext uri="{FF2B5EF4-FFF2-40B4-BE49-F238E27FC236}">
+                <a16:creationId xmlns:a16="http://schemas.microsoft.com/office/drawing/2014/main" id="{02CACA2B-95AF-E140-A324-2E3686935406}"/>
+              </a:ext>
+            </a:extLst>
+          </p:cNvPr>
+          <p:cNvSpPr>
+            <a:spLocks noGrp="1"/>
+          </p:cNvSpPr>
+          <p:nvPr>
+            <p:ph type="title"/>
+          </p:nvPr>
+        </p:nvSpPr>
+        <p:spPr/>
+        <p:txBody>
+          <a:bodyPr/>
+          <a:lstStyle/>
+          <a:p>
+            <a:r>
+              <a:rPr lang="en-US" b="1" dirty="0"/>
+              <a:t>R</a:t>
+            </a:r>
+            <a:r>
+              <a:rPr lang="en-US" b="1" baseline="30000" dirty="0"/>
+              <a:t>2</a:t>
+            </a:r>
+            <a:r>
+              <a:rPr lang="en-US" b="1" dirty="0"/>
+              <a:t> Scores of all the Algorithms</a:t>
+            </a:r>
+          </a:p>
+        </p:txBody>
+      </p:sp>
+      <p:sp>
+        <p:nvSpPr>
+          <p:cNvPr id="3" name="Content Placeholder 2">
+            <a:extLst>
+              <a:ext uri="{FF2B5EF4-FFF2-40B4-BE49-F238E27FC236}">
+                <a16:creationId xmlns:a16="http://schemas.microsoft.com/office/drawing/2014/main" id="{3E902F7D-2343-044B-B44B-5C2B5AECD6CA}"/>
+              </a:ext>
+            </a:extLst>
+          </p:cNvPr>
+          <p:cNvSpPr>
+            <a:spLocks noGrp="1"/>
+          </p:cNvSpPr>
+          <p:nvPr>
+            <p:ph idx="1"/>
+          </p:nvPr>
+        </p:nvSpPr>
+        <p:spPr/>
+        <p:txBody>
+          <a:bodyPr/>
+          <a:lstStyle/>
+          <a:p>
+            <a:endParaRPr lang="en-US" dirty="0"/>
           </a:p>
         </p:txBody>
       </p:sp>
@@ -13799,16 +14308,14 @@
           <p:cNvPr id="4" name="Content Placeholder 3">
             <a:extLst>
               <a:ext uri="{FF2B5EF4-FFF2-40B4-BE49-F238E27FC236}">
-                <a16:creationId xmlns:a16="http://schemas.microsoft.com/office/drawing/2014/main" id="{D32C2ED0-EAC7-E142-BF2C-9455C9A8472B}"/>
+                <a16:creationId xmlns:a16="http://schemas.microsoft.com/office/drawing/2014/main" id="{28F8D113-B672-1540-A0C7-671DDDF48467}"/>
               </a:ext>
             </a:extLst>
           </p:cNvPr>
           <p:cNvPicPr>
-            <a:picLocks noGrp="1" noChangeAspect="1"/>
+            <a:picLocks noChangeAspect="1"/>
           </p:cNvPicPr>
-          <p:nvPr>
-            <p:ph idx="1"/>
-          </p:nvPr>
+          <p:nvPr/>
         </p:nvPicPr>
         <p:blipFill>
           <a:blip r:embed="rId2"/>
@@ -13818,7 +14325,7 @@
         </p:blipFill>
         <p:spPr>
           <a:xfrm>
-            <a:off x="2553422" y="2603500"/>
+            <a:off x="2553048" y="2603500"/>
             <a:ext cx="6029469" cy="3416300"/>
           </a:xfrm>
           <a:prstGeom prst="rect">
@@ -13829,7 +14336,240 @@
     </p:spTree>
     <p:extLst>
       <p:ext uri="{BB962C8B-B14F-4D97-AF65-F5344CB8AC3E}">
-        <p14:creationId xmlns:p14="http://schemas.microsoft.com/office/powerpoint/2010/main" val="1934809408"/>
+        <p14:creationId xmlns:p14="http://schemas.microsoft.com/office/powerpoint/2010/main" val="2927588575"/>
+      </p:ext>
+    </p:extLst>
+  </p:cSld>
+  <p:clrMapOvr>
+    <a:masterClrMapping/>
+  </p:clrMapOvr>
+</p:sld>
+</file>
+
+<file path=ppt/slides/slide17.xml><?xml version="1.0" encoding="utf-8"?>
+<p:sld xmlns:a="http://schemas.openxmlformats.org/drawingml/2006/main" xmlns:r="http://schemas.openxmlformats.org/officeDocument/2006/relationships" xmlns:p="http://schemas.openxmlformats.org/presentationml/2006/main">
+  <p:cSld>
+    <p:spTree>
+      <p:nvGrpSpPr>
+        <p:cNvPr id="1" name=""/>
+        <p:cNvGrpSpPr/>
+        <p:nvPr/>
+      </p:nvGrpSpPr>
+      <p:grpSpPr>
+        <a:xfrm>
+          <a:off x="0" y="0"/>
+          <a:ext cx="0" cy="0"/>
+          <a:chOff x="0" y="0"/>
+          <a:chExt cx="0" cy="0"/>
+        </a:xfrm>
+      </p:grpSpPr>
+      <p:sp>
+        <p:nvSpPr>
+          <p:cNvPr id="2" name="Title 1">
+            <a:extLst>
+              <a:ext uri="{FF2B5EF4-FFF2-40B4-BE49-F238E27FC236}">
+                <a16:creationId xmlns:a16="http://schemas.microsoft.com/office/drawing/2014/main" id="{1490DBF8-93C9-6241-892A-5A54DA4C5D4F}"/>
+              </a:ext>
+            </a:extLst>
+          </p:cNvPr>
+          <p:cNvSpPr>
+            <a:spLocks noGrp="1"/>
+          </p:cNvSpPr>
+          <p:nvPr>
+            <p:ph type="title"/>
+          </p:nvPr>
+        </p:nvSpPr>
+        <p:spPr/>
+        <p:txBody>
+          <a:bodyPr/>
+          <a:lstStyle/>
+          <a:p>
+            <a:r>
+              <a:rPr lang="en-US" b="1" dirty="0"/>
+              <a:t>CONCLUSION</a:t>
+            </a:r>
+          </a:p>
+        </p:txBody>
+      </p:sp>
+      <p:sp>
+        <p:nvSpPr>
+          <p:cNvPr id="3" name="Content Placeholder 2">
+            <a:extLst>
+              <a:ext uri="{FF2B5EF4-FFF2-40B4-BE49-F238E27FC236}">
+                <a16:creationId xmlns:a16="http://schemas.microsoft.com/office/drawing/2014/main" id="{F8AB0836-EACF-AF49-938F-F11424DCE30B}"/>
+              </a:ext>
+            </a:extLst>
+          </p:cNvPr>
+          <p:cNvSpPr>
+            <a:spLocks noGrp="1"/>
+          </p:cNvSpPr>
+          <p:nvPr>
+            <p:ph idx="1"/>
+          </p:nvPr>
+        </p:nvSpPr>
+        <p:spPr/>
+        <p:txBody>
+          <a:bodyPr>
+            <a:normAutofit lnSpcReduction="10000"/>
+          </a:bodyPr>
+          <a:lstStyle/>
+          <a:p>
+            <a:r>
+              <a:rPr lang="en-US" dirty="0"/>
+              <a:t>It is clear from the previous table, five out </a:t>
+            </a:r>
+            <a:r>
+              <a:rPr lang="en-US"/>
+              <a:t>of ten </a:t>
+            </a:r>
+            <a:r>
+              <a:rPr lang="en-US" dirty="0"/>
+              <a:t>times, Decision Tree’s scores were closer to 1 than any other algorithm</a:t>
+            </a:r>
+          </a:p>
+          <a:p>
+            <a:pPr marL="0" indent="0">
+              <a:buNone/>
+            </a:pPr>
+            <a:endParaRPr lang="en-US" dirty="0"/>
+          </a:p>
+          <a:p>
+            <a:r>
+              <a:rPr lang="en-US" dirty="0"/>
+              <a:t>Four out of ten times, Random Forest’s scores were closest to 1</a:t>
+            </a:r>
+          </a:p>
+          <a:p>
+            <a:endParaRPr lang="en-US" dirty="0"/>
+          </a:p>
+          <a:p>
+            <a:r>
+              <a:rPr lang="en-US" dirty="0"/>
+              <a:t>Multiple Linear Regression scores were closest to 1 only one out of ten times.</a:t>
+            </a:r>
+          </a:p>
+          <a:p>
+            <a:endParaRPr lang="en-US" dirty="0"/>
+          </a:p>
+          <a:p>
+            <a:r>
+              <a:rPr lang="en-US" dirty="0"/>
+              <a:t>Therefore, Decision Tree performed better when compared to Random Forest and Multiple Linear Regression.</a:t>
+            </a:r>
+          </a:p>
+          <a:p>
+            <a:endParaRPr lang="en-US" dirty="0"/>
+          </a:p>
+          <a:p>
+            <a:endParaRPr lang="en-US" dirty="0"/>
+          </a:p>
+        </p:txBody>
+      </p:sp>
+    </p:spTree>
+    <p:extLst>
+      <p:ext uri="{BB962C8B-B14F-4D97-AF65-F5344CB8AC3E}">
+        <p14:creationId xmlns:p14="http://schemas.microsoft.com/office/powerpoint/2010/main" val="1798813038"/>
+      </p:ext>
+    </p:extLst>
+  </p:cSld>
+  <p:clrMapOvr>
+    <a:masterClrMapping/>
+  </p:clrMapOvr>
+</p:sld>
+</file>
+
+<file path=ppt/slides/slide18.xml><?xml version="1.0" encoding="utf-8"?>
+<p:sld xmlns:a="http://schemas.openxmlformats.org/drawingml/2006/main" xmlns:r="http://schemas.openxmlformats.org/officeDocument/2006/relationships" xmlns:p="http://schemas.openxmlformats.org/presentationml/2006/main">
+  <p:cSld>
+    <p:spTree>
+      <p:nvGrpSpPr>
+        <p:cNvPr id="1" name=""/>
+        <p:cNvGrpSpPr/>
+        <p:nvPr/>
+      </p:nvGrpSpPr>
+      <p:grpSpPr>
+        <a:xfrm>
+          <a:off x="0" y="0"/>
+          <a:ext cx="0" cy="0"/>
+          <a:chOff x="0" y="0"/>
+          <a:chExt cx="0" cy="0"/>
+        </a:xfrm>
+      </p:grpSpPr>
+      <p:sp>
+        <p:nvSpPr>
+          <p:cNvPr id="2" name="Title 1">
+            <a:extLst>
+              <a:ext uri="{FF2B5EF4-FFF2-40B4-BE49-F238E27FC236}">
+                <a16:creationId xmlns:a16="http://schemas.microsoft.com/office/drawing/2014/main" id="{2923B4E6-0042-1442-BC02-2660A6FEF36F}"/>
+              </a:ext>
+            </a:extLst>
+          </p:cNvPr>
+          <p:cNvSpPr>
+            <a:spLocks noGrp="1"/>
+          </p:cNvSpPr>
+          <p:nvPr>
+            <p:ph type="title"/>
+          </p:nvPr>
+        </p:nvSpPr>
+        <p:spPr/>
+        <p:txBody>
+          <a:bodyPr/>
+          <a:lstStyle/>
+          <a:p>
+            <a:r>
+              <a:rPr lang="en-US" b="1" dirty="0"/>
+              <a:t>FUTURE ENHANCEMENTS</a:t>
+            </a:r>
+          </a:p>
+        </p:txBody>
+      </p:sp>
+      <p:sp>
+        <p:nvSpPr>
+          <p:cNvPr id="3" name="Content Placeholder 2">
+            <a:extLst>
+              <a:ext uri="{FF2B5EF4-FFF2-40B4-BE49-F238E27FC236}">
+                <a16:creationId xmlns:a16="http://schemas.microsoft.com/office/drawing/2014/main" id="{01D66CA0-FEB5-6146-A944-665B55010BAA}"/>
+              </a:ext>
+            </a:extLst>
+          </p:cNvPr>
+          <p:cNvSpPr>
+            <a:spLocks noGrp="1"/>
+          </p:cNvSpPr>
+          <p:nvPr>
+            <p:ph idx="1"/>
+          </p:nvPr>
+        </p:nvSpPr>
+        <p:spPr/>
+        <p:txBody>
+          <a:bodyPr/>
+          <a:lstStyle/>
+          <a:p>
+            <a:endParaRPr lang="en-US" dirty="0"/>
+          </a:p>
+          <a:p>
+            <a:endParaRPr lang="en-US" dirty="0"/>
+          </a:p>
+          <a:p>
+            <a:r>
+              <a:rPr lang="en-US" dirty="0"/>
+              <a:t>All the data used in this project was based on a few assumptions</a:t>
+            </a:r>
+          </a:p>
+          <a:p>
+            <a:endParaRPr lang="en-US" dirty="0"/>
+          </a:p>
+          <a:p>
+            <a:r>
+              <a:rPr lang="en-US" dirty="0"/>
+              <a:t>Next step would be to collect real world data from an actual aircraft engine and then perform predictive analysis in a similar manner</a:t>
+            </a:r>
+          </a:p>
+        </p:txBody>
+      </p:sp>
+    </p:spTree>
+    <p:extLst>
+      <p:ext uri="{BB962C8B-B14F-4D97-AF65-F5344CB8AC3E}">
+        <p14:creationId xmlns:p14="http://schemas.microsoft.com/office/powerpoint/2010/main" val="300066167"/>
       </p:ext>
     </p:extLst>
   </p:cSld>
@@ -13908,7 +14648,7 @@
           <a:p>
             <a:r>
               <a:rPr lang="en-US" sz="2000" dirty="0"/>
-              <a:t>To predict the probability of failure of an aircraft engine based on five parameters using three machine learning algorithms and comparing the performances of each algorithm</a:t>
+              <a:t>To predict the probability of failure of an aircraft engine using three machine learning algorithms and comparing the performances of each algorithm</a:t>
             </a:r>
           </a:p>
           <a:p>
@@ -13996,13 +14736,69 @@
         <p:spPr/>
         <p:txBody>
           <a:bodyPr>
-            <a:normAutofit/>
+            <a:normAutofit fontScale="77500" lnSpcReduction="20000"/>
           </a:bodyPr>
           <a:lstStyle/>
           <a:p>
             <a:r>
               <a:rPr lang="en-US" sz="2000" dirty="0"/>
-              <a:t>Aircraft engine failure constitutes multiple reasons such as noise from the fan blade, exhaust gas temperature of turbine, fuel flow of turbine, low pressure fan speed, high pressure rotor speed, mechanical problems in the engine, oil leaks, fuel pump problems etc.</a:t>
+              <a:t>Aircraft engine failure constitutes multiple reasons some of which are listed below: </a:t>
+            </a:r>
+          </a:p>
+          <a:p>
+            <a:pPr lvl="1"/>
+            <a:r>
+              <a:rPr lang="en-US" sz="1800" dirty="0"/>
+              <a:t>Noise from the Fan Blade</a:t>
+            </a:r>
+          </a:p>
+          <a:p>
+            <a:pPr lvl="1"/>
+            <a:r>
+              <a:rPr lang="en-US" sz="1800" dirty="0"/>
+              <a:t>Exhaust Gas Temperature of Turbine</a:t>
+            </a:r>
+          </a:p>
+          <a:p>
+            <a:pPr lvl="1"/>
+            <a:r>
+              <a:rPr lang="en-US" sz="1800" dirty="0"/>
+              <a:t>Fuel Flow of Turbine</a:t>
+            </a:r>
+          </a:p>
+          <a:p>
+            <a:pPr lvl="1"/>
+            <a:r>
+              <a:rPr lang="en-US" sz="1800" dirty="0"/>
+              <a:t>Low Pressure Fan Speed</a:t>
+            </a:r>
+          </a:p>
+          <a:p>
+            <a:pPr lvl="1"/>
+            <a:r>
+              <a:rPr lang="en-US" sz="1800" dirty="0"/>
+              <a:t>High Pressure Rotor Speed</a:t>
+            </a:r>
+          </a:p>
+          <a:p>
+            <a:pPr lvl="1"/>
+            <a:r>
+              <a:rPr lang="en-US" sz="1800" dirty="0"/>
+              <a:t>Mechanical problems in the engine</a:t>
+            </a:r>
+          </a:p>
+          <a:p>
+            <a:pPr lvl="1"/>
+            <a:r>
+              <a:rPr lang="en-US" sz="1800" dirty="0"/>
+              <a:t>Oil Leaks</a:t>
+            </a:r>
+          </a:p>
+          <a:p>
+            <a:pPr lvl="1"/>
+            <a:r>
+              <a:rPr lang="en-US" sz="1800" dirty="0"/>
+              <a:t>Fuel Pump problems</a:t>
             </a:r>
           </a:p>
           <a:p>
@@ -14011,7 +14807,7 @@
           <a:p>
             <a:r>
               <a:rPr lang="en-US" sz="2000" dirty="0"/>
-              <a:t>We have considered five components – Fan Blade Noise, Exhaust Gas Temperature of Turbine, Fuel Flow of Turbine, Low Pressure Fan Speed and High Pressure Rotor Speed</a:t>
+              <a:t>We have considered the first five components for this project</a:t>
             </a:r>
           </a:p>
         </p:txBody>
@@ -14093,25 +14889,10 @@
         <p:spPr/>
         <p:txBody>
           <a:bodyPr>
-            <a:normAutofit fontScale="92500" lnSpcReduction="20000"/>
+            <a:normAutofit/>
           </a:bodyPr>
           <a:lstStyle/>
           <a:p>
-            <a:r>
-              <a:rPr lang="en-US" sz="2000" dirty="0"/>
-              <a:t>Data, in the absence of its availability, has been generated based on nominal value and random degradation</a:t>
-            </a:r>
-          </a:p>
-          <a:p>
-            <a:endParaRPr lang="en-US" sz="2000" dirty="0"/>
-          </a:p>
-          <a:p>
-            <a:r>
-              <a:rPr lang="en-US" sz="2000" dirty="0"/>
-              <a:t>The probability of failure of each component starts to increase when it reaches a certain value</a:t>
-            </a:r>
-          </a:p>
-          <a:p>
             <a:endParaRPr lang="en-US" sz="2000" dirty="0"/>
           </a:p>
           <a:p>
@@ -14126,7 +14907,7 @@
           <a:p>
             <a:r>
               <a:rPr lang="en-US" sz="2000" dirty="0"/>
-              <a:t>The Turbine Engine fails completely when the probability reaches 1</a:t>
+              <a:t>The Turbine Engine fails completely when the probability gets close to one</a:t>
             </a:r>
           </a:p>
         </p:txBody>
@@ -14207,12 +14988,14 @@
         </p:nvSpPr>
         <p:spPr/>
         <p:txBody>
-          <a:bodyPr/>
+          <a:bodyPr>
+            <a:normAutofit fontScale="92500" lnSpcReduction="20000"/>
+          </a:bodyPr>
           <a:lstStyle/>
           <a:p>
             <a:r>
               <a:rPr lang="en-US" dirty="0"/>
-              <a:t>Data of 1000 engines are generated</a:t>
+              <a:t>In the absence of real data, degradation in a component is generated based on its base value and random distribution</a:t>
             </a:r>
           </a:p>
           <a:p>
@@ -14221,7 +15004,7 @@
           <a:p>
             <a:r>
               <a:rPr lang="en-US" dirty="0"/>
-              <a:t>In the first phase, using the generated data, Multiple Linear Regression algorithm is applied and the model is saved separately</a:t>
+              <a:t>Thousand data sets are generated for training the Machine Learning Algorithms</a:t>
             </a:r>
           </a:p>
           <a:p>
@@ -14230,7 +15013,7 @@
           <a:p>
             <a:r>
               <a:rPr lang="en-US" dirty="0"/>
-              <a:t>In the second and consecutive phases, Decision Tree and Random Forest algorithms are applied and their models are saved as well</a:t>
+              <a:t>Another set of data is generated for validating the prediction of the probability of failure of the Turbine</a:t>
             </a:r>
           </a:p>
           <a:p>
@@ -14239,8 +15022,17 @@
           <a:p>
             <a:r>
               <a:rPr lang="en-US" dirty="0"/>
-              <a:t>Data for another 10 engines with random degradation is again generated</a:t>
-            </a:r>
+              <a:t>Three different Machine Learning Algorithms are used to predict the probability of failure</a:t>
+            </a:r>
+          </a:p>
+          <a:p>
+            <a:endParaRPr lang="en-US" dirty="0"/>
+          </a:p>
+          <a:p>
+            <a:pPr marL="0" indent="0">
+              <a:buNone/>
+            </a:pPr>
+            <a:endParaRPr lang="en-US" dirty="0"/>
           </a:p>
           <a:p>
             <a:endParaRPr lang="en-US" dirty="0"/>
@@ -14326,12 +15118,14 @@
         </p:nvSpPr>
         <p:spPr/>
         <p:txBody>
-          <a:bodyPr/>
+          <a:bodyPr>
+            <a:normAutofit fontScale="92500" lnSpcReduction="10000"/>
+          </a:bodyPr>
           <a:lstStyle/>
           <a:p>
             <a:r>
               <a:rPr lang="en-US" dirty="0"/>
-              <a:t>Multiple Linear Regression’s model is loaded to the new dataset</a:t>
+              <a:t>Simulation is carried out in three phases totally</a:t>
             </a:r>
           </a:p>
           <a:p>
@@ -14340,7 +15134,7 @@
           <a:p>
             <a:r>
               <a:rPr lang="en-US" dirty="0"/>
-              <a:t>The probability of failure is then calculated for each of the 10 engines</a:t>
+              <a:t>In the first phase, Multiple Linear Regression has been used</a:t>
             </a:r>
           </a:p>
           <a:p>
@@ -14349,7 +15143,7 @@
           <a:p>
             <a:r>
               <a:rPr lang="en-US" dirty="0"/>
-              <a:t>This process is repeated for Decision Tree and Random Forest algorithms</a:t>
+              <a:t>In the second phase, Decision Tree Regression has been used</a:t>
             </a:r>
           </a:p>
           <a:p>
@@ -14358,17 +15152,20 @@
           <a:p>
             <a:r>
               <a:rPr lang="en-US" dirty="0"/>
-              <a:t>The accuracy of each algorithm is calculated by computing the R</a:t>
-            </a:r>
-            <a:r>
-              <a:rPr lang="en-US" baseline="30000" dirty="0"/>
-              <a:t>2 </a:t>
-            </a:r>
+              <a:t>In the third and final phase, Random Forest Regression has been used</a:t>
+            </a:r>
+          </a:p>
+          <a:p>
+            <a:endParaRPr lang="en-US" dirty="0"/>
+          </a:p>
+          <a:p>
             <a:r>
               <a:rPr lang="en-US" dirty="0"/>
-              <a:t>Score.</a:t>
-            </a:r>
-            <a:endParaRPr lang="en-US" baseline="30000" dirty="0"/>
+              <a:t>Results of all these algorithms are compared by computing the R2 Score</a:t>
+            </a:r>
+          </a:p>
+          <a:p>
+            <a:endParaRPr lang="en-US" dirty="0"/>
           </a:p>
         </p:txBody>
       </p:sp>
@@ -14404,7 +15201,13 @@
       </p:grpSpPr>
       <p:sp>
         <p:nvSpPr>
-          <p:cNvPr id="2" name="Title 1"/>
+          <p:cNvPr id="2" name="Title 1">
+            <a:extLst>
+              <a:ext uri="{FF2B5EF4-FFF2-40B4-BE49-F238E27FC236}">
+                <a16:creationId xmlns:a16="http://schemas.microsoft.com/office/drawing/2014/main" id="{5E5926EE-4CA1-E64D-B7AC-A0951DAC47A0}"/>
+              </a:ext>
+            </a:extLst>
+          </p:cNvPr>
           <p:cNvSpPr>
             <a:spLocks noGrp="1"/>
           </p:cNvSpPr>
@@ -14414,71 +15217,582 @@
         </p:nvSpPr>
         <p:spPr/>
         <p:txBody>
-          <a:bodyPr>
-            <a:normAutofit fontScale="90000"/>
-          </a:bodyPr>
+          <a:bodyPr/>
           <a:lstStyle/>
           <a:p>
             <a:r>
               <a:rPr lang="en-US" b="1" dirty="0"/>
-              <a:t>SAMPLE DATA (under normal conditions)</a:t>
+              <a:t>ALGORITHM - MULTIPLE LINEAR REGRESSION</a:t>
             </a:r>
           </a:p>
         </p:txBody>
       </p:sp>
-      <p:sp>
-        <p:nvSpPr>
-          <p:cNvPr id="7" name="Content Placeholder 6"/>
-          <p:cNvSpPr>
-            <a:spLocks noGrp="1"/>
-          </p:cNvSpPr>
-          <p:nvPr>
-            <p:ph idx="1"/>
-          </p:nvPr>
-        </p:nvSpPr>
-        <p:spPr/>
-        <p:txBody>
-          <a:bodyPr/>
-          <a:lstStyle/>
-          <a:p>
-            <a:endParaRPr lang="en-US" dirty="0"/>
-          </a:p>
-        </p:txBody>
-      </p:sp>
-      <p:pic>
-        <p:nvPicPr>
-          <p:cNvPr id="4" name="Picture 3">
-            <a:extLst>
-              <a:ext uri="{FF2B5EF4-FFF2-40B4-BE49-F238E27FC236}">
-                <a16:creationId xmlns:a16="http://schemas.microsoft.com/office/drawing/2014/main" id="{0FC6717A-E835-F048-8594-C4004A32DF4B}"/>
-              </a:ext>
-            </a:extLst>
-          </p:cNvPr>
-          <p:cNvPicPr>
-            <a:picLocks noChangeAspect="1"/>
-          </p:cNvPicPr>
-          <p:nvPr/>
-        </p:nvPicPr>
-        <p:blipFill>
-          <a:blip r:embed="rId2"/>
-          <a:stretch>
-            <a:fillRect/>
-          </a:stretch>
-        </p:blipFill>
-        <p:spPr>
-          <a:xfrm>
-            <a:off x="1049850" y="2422609"/>
-            <a:ext cx="10070094" cy="3778081"/>
-          </a:xfrm>
-          <a:prstGeom prst="rect">
-            <a:avLst/>
-          </a:prstGeom>
-        </p:spPr>
-      </p:pic>
+      <mc:AlternateContent xmlns:mc="http://schemas.openxmlformats.org/markup-compatibility/2006">
+        <mc:Choice xmlns:a14="http://schemas.microsoft.com/office/drawing/2010/main" Requires="a14">
+          <p:sp>
+            <p:nvSpPr>
+              <p:cNvPr id="3" name="Content Placeholder 2">
+                <a:extLst>
+                  <a:ext uri="{FF2B5EF4-FFF2-40B4-BE49-F238E27FC236}">
+                    <a16:creationId xmlns:a16="http://schemas.microsoft.com/office/drawing/2014/main" id="{2A4CDC7B-A586-664F-AB77-D3BA1F2BFB7D}"/>
+                  </a:ext>
+                </a:extLst>
+              </p:cNvPr>
+              <p:cNvSpPr>
+                <a:spLocks noGrp="1"/>
+              </p:cNvSpPr>
+              <p:nvPr>
+                <p:ph idx="1"/>
+              </p:nvPr>
+            </p:nvSpPr>
+            <p:spPr/>
+            <p:txBody>
+              <a:bodyPr/>
+              <a:lstStyle/>
+              <a:p>
+                <a:r>
+                  <a:rPr lang="en-IN" dirty="0"/>
+                  <a:t>Multiple Linear Regression is a linear approach to modelling the relationship between a scalar response (dependent variable) and multiple explanatory variables (independent variables)</a:t>
+                </a:r>
+              </a:p>
+              <a:p>
+                <a:endParaRPr lang="en-US" dirty="0"/>
+              </a:p>
+              <a:p>
+                <a:r>
+                  <a:rPr lang="en-US" dirty="0"/>
+                  <a:t>The model for Multiple Linear Regression, given n observations, is			</a:t>
+                </a:r>
+                <a14:m>
+                  <m:oMath xmlns:m="http://schemas.openxmlformats.org/officeDocument/2006/math">
+                    <m:sSub>
+                      <m:sSubPr>
+                        <m:ctrlPr>
+                          <a:rPr lang="en-US" b="0" i="1" smtClean="0">
+                            <a:latin typeface="Cambria Math" panose="02040503050406030204" pitchFamily="18" charset="0"/>
+                          </a:rPr>
+                        </m:ctrlPr>
+                      </m:sSubPr>
+                      <m:e>
+                        <m:r>
+                          <a:rPr lang="en-US" b="0" i="1" smtClean="0">
+                            <a:latin typeface="Cambria Math" panose="02040503050406030204" pitchFamily="18" charset="0"/>
+                          </a:rPr>
+                          <m:t>𝑦</m:t>
+                        </m:r>
+                      </m:e>
+                      <m:sub>
+                        <m:r>
+                          <a:rPr lang="en-US" b="0" i="1" smtClean="0">
+                            <a:latin typeface="Cambria Math" panose="02040503050406030204" pitchFamily="18" charset="0"/>
+                          </a:rPr>
+                          <m:t>𝑖</m:t>
+                        </m:r>
+                      </m:sub>
+                    </m:sSub>
+                    <m:r>
+                      <a:rPr lang="en-US" b="0" i="1" smtClean="0">
+                        <a:latin typeface="Cambria Math" panose="02040503050406030204" pitchFamily="18" charset="0"/>
+                      </a:rPr>
+                      <m:t>=</m:t>
+                    </m:r>
+                    <m:sSub>
+                      <m:sSubPr>
+                        <m:ctrlPr>
+                          <a:rPr lang="en-US" b="0" i="1" smtClean="0">
+                            <a:latin typeface="Cambria Math" panose="02040503050406030204" pitchFamily="18" charset="0"/>
+                          </a:rPr>
+                        </m:ctrlPr>
+                      </m:sSubPr>
+                      <m:e>
+                        <m:r>
+                          <a:rPr lang="en-US" b="0" i="1" smtClean="0">
+                            <a:latin typeface="Cambria Math" panose="02040503050406030204" pitchFamily="18" charset="0"/>
+                          </a:rPr>
+                          <m:t>𝑏</m:t>
+                        </m:r>
+                      </m:e>
+                      <m:sub>
+                        <m:r>
+                          <a:rPr lang="en-US" b="0" i="1" smtClean="0">
+                            <a:latin typeface="Cambria Math" panose="02040503050406030204" pitchFamily="18" charset="0"/>
+                          </a:rPr>
+                          <m:t>0</m:t>
+                        </m:r>
+                      </m:sub>
+                    </m:sSub>
+                    <m:r>
+                      <a:rPr lang="en-US" b="0" i="1" smtClean="0">
+                        <a:latin typeface="Cambria Math" panose="02040503050406030204" pitchFamily="18" charset="0"/>
+                      </a:rPr>
+                      <m:t>+ </m:t>
+                    </m:r>
+                    <m:sSub>
+                      <m:sSubPr>
+                        <m:ctrlPr>
+                          <a:rPr lang="en-US" b="0" i="1" smtClean="0">
+                            <a:latin typeface="Cambria Math" panose="02040503050406030204" pitchFamily="18" charset="0"/>
+                          </a:rPr>
+                        </m:ctrlPr>
+                      </m:sSubPr>
+                      <m:e>
+                        <m:r>
+                          <a:rPr lang="en-US" b="0" i="1" smtClean="0">
+                            <a:latin typeface="Cambria Math" panose="02040503050406030204" pitchFamily="18" charset="0"/>
+                          </a:rPr>
+                          <m:t>𝑏</m:t>
+                        </m:r>
+                      </m:e>
+                      <m:sub>
+                        <m:r>
+                          <a:rPr lang="en-US" b="0" i="1" smtClean="0">
+                            <a:latin typeface="Cambria Math" panose="02040503050406030204" pitchFamily="18" charset="0"/>
+                          </a:rPr>
+                          <m:t>1</m:t>
+                        </m:r>
+                      </m:sub>
+                    </m:sSub>
+                    <m:sSub>
+                      <m:sSubPr>
+                        <m:ctrlPr>
+                          <a:rPr lang="en-US" b="0" i="1" smtClean="0">
+                            <a:latin typeface="Cambria Math" panose="02040503050406030204" pitchFamily="18" charset="0"/>
+                          </a:rPr>
+                        </m:ctrlPr>
+                      </m:sSubPr>
+                      <m:e>
+                        <m:r>
+                          <a:rPr lang="en-US" b="0" i="1" smtClean="0">
+                            <a:latin typeface="Cambria Math" panose="02040503050406030204" pitchFamily="18" charset="0"/>
+                          </a:rPr>
+                          <m:t>𝑋</m:t>
+                        </m:r>
+                      </m:e>
+                      <m:sub>
+                        <m:r>
+                          <a:rPr lang="en-US" b="0" i="1" smtClean="0">
+                            <a:latin typeface="Cambria Math" panose="02040503050406030204" pitchFamily="18" charset="0"/>
+                          </a:rPr>
+                          <m:t>𝑖</m:t>
+                        </m:r>
+                        <m:r>
+                          <a:rPr lang="en-US" b="0" i="1" smtClean="0">
+                            <a:latin typeface="Cambria Math" panose="02040503050406030204" pitchFamily="18" charset="0"/>
+                          </a:rPr>
+                          <m:t>1</m:t>
+                        </m:r>
+                      </m:sub>
+                    </m:sSub>
+                    <m:r>
+                      <a:rPr lang="en-US" b="0" i="1" smtClean="0">
+                        <a:latin typeface="Cambria Math" panose="02040503050406030204" pitchFamily="18" charset="0"/>
+                      </a:rPr>
+                      <m:t>+ </m:t>
+                    </m:r>
+                    <m:sSub>
+                      <m:sSubPr>
+                        <m:ctrlPr>
+                          <a:rPr lang="en-US" b="0" i="1" smtClean="0">
+                            <a:latin typeface="Cambria Math" panose="02040503050406030204" pitchFamily="18" charset="0"/>
+                          </a:rPr>
+                        </m:ctrlPr>
+                      </m:sSubPr>
+                      <m:e>
+                        <m:r>
+                          <a:rPr lang="en-US" b="0" i="1" smtClean="0">
+                            <a:latin typeface="Cambria Math" panose="02040503050406030204" pitchFamily="18" charset="0"/>
+                          </a:rPr>
+                          <m:t>𝑏</m:t>
+                        </m:r>
+                      </m:e>
+                      <m:sub>
+                        <m:r>
+                          <a:rPr lang="en-US" b="0" i="1" smtClean="0">
+                            <a:latin typeface="Cambria Math" panose="02040503050406030204" pitchFamily="18" charset="0"/>
+                          </a:rPr>
+                          <m:t>2</m:t>
+                        </m:r>
+                      </m:sub>
+                    </m:sSub>
+                    <m:sSub>
+                      <m:sSubPr>
+                        <m:ctrlPr>
+                          <a:rPr lang="en-US" b="0" i="1" smtClean="0">
+                            <a:latin typeface="Cambria Math" panose="02040503050406030204" pitchFamily="18" charset="0"/>
+                          </a:rPr>
+                        </m:ctrlPr>
+                      </m:sSubPr>
+                      <m:e>
+                        <m:r>
+                          <a:rPr lang="en-US" b="0" i="1" smtClean="0">
+                            <a:latin typeface="Cambria Math" panose="02040503050406030204" pitchFamily="18" charset="0"/>
+                          </a:rPr>
+                          <m:t>𝑋</m:t>
+                        </m:r>
+                      </m:e>
+                      <m:sub>
+                        <m:r>
+                          <a:rPr lang="en-US" b="0" i="1" smtClean="0">
+                            <a:latin typeface="Cambria Math" panose="02040503050406030204" pitchFamily="18" charset="0"/>
+                          </a:rPr>
+                          <m:t>𝑖</m:t>
+                        </m:r>
+                        <m:r>
+                          <a:rPr lang="en-US" b="0" i="1" smtClean="0">
+                            <a:latin typeface="Cambria Math" panose="02040503050406030204" pitchFamily="18" charset="0"/>
+                          </a:rPr>
+                          <m:t>2</m:t>
+                        </m:r>
+                      </m:sub>
+                    </m:sSub>
+                    <m:r>
+                      <a:rPr lang="en-US" b="0" i="1" smtClean="0">
+                        <a:latin typeface="Cambria Math" panose="02040503050406030204" pitchFamily="18" charset="0"/>
+                      </a:rPr>
+                      <m:t>+ … + </m:t>
+                    </m:r>
+                    <m:sSub>
+                      <m:sSubPr>
+                        <m:ctrlPr>
+                          <a:rPr lang="en-US" b="0" i="1" smtClean="0">
+                            <a:latin typeface="Cambria Math" panose="02040503050406030204" pitchFamily="18" charset="0"/>
+                          </a:rPr>
+                        </m:ctrlPr>
+                      </m:sSubPr>
+                      <m:e>
+                        <m:r>
+                          <a:rPr lang="en-US" b="0" i="1" smtClean="0">
+                            <a:latin typeface="Cambria Math" panose="02040503050406030204" pitchFamily="18" charset="0"/>
+                          </a:rPr>
+                          <m:t>𝑏</m:t>
+                        </m:r>
+                      </m:e>
+                      <m:sub>
+                        <m:r>
+                          <a:rPr lang="en-US" b="0" i="1" smtClean="0">
+                            <a:latin typeface="Cambria Math" panose="02040503050406030204" pitchFamily="18" charset="0"/>
+                          </a:rPr>
+                          <m:t>𝑝</m:t>
+                        </m:r>
+                      </m:sub>
+                    </m:sSub>
+                    <m:sSub>
+                      <m:sSubPr>
+                        <m:ctrlPr>
+                          <a:rPr lang="en-US" b="0" i="1" smtClean="0">
+                            <a:latin typeface="Cambria Math" panose="02040503050406030204" pitchFamily="18" charset="0"/>
+                          </a:rPr>
+                        </m:ctrlPr>
+                      </m:sSubPr>
+                      <m:e>
+                        <m:r>
+                          <a:rPr lang="en-US" b="0" i="1" smtClean="0">
+                            <a:latin typeface="Cambria Math" panose="02040503050406030204" pitchFamily="18" charset="0"/>
+                          </a:rPr>
+                          <m:t>𝑋</m:t>
+                        </m:r>
+                      </m:e>
+                      <m:sub>
+                        <m:r>
+                          <a:rPr lang="en-US" b="0" i="1" smtClean="0">
+                            <a:latin typeface="Cambria Math" panose="02040503050406030204" pitchFamily="18" charset="0"/>
+                          </a:rPr>
+                          <m:t>𝑖𝑝</m:t>
+                        </m:r>
+                      </m:sub>
+                    </m:sSub>
+                    <m:r>
+                      <a:rPr lang="en-US" b="0" i="1" smtClean="0">
+                        <a:latin typeface="Cambria Math" panose="02040503050406030204" pitchFamily="18" charset="0"/>
+                      </a:rPr>
+                      <m:t> </m:t>
+                    </m:r>
+                  </m:oMath>
+                </a14:m>
+                <a:r>
+                  <a:rPr lang="en-US" b="0" baseline="-25000" dirty="0"/>
+                  <a:t> </a:t>
+                </a:r>
+                <a:r>
+                  <a:rPr lang="en-US" b="0" dirty="0"/>
+                  <a:t>  for </a:t>
+                </a:r>
+                <a:r>
+                  <a:rPr lang="en-US" b="0" dirty="0" err="1"/>
+                  <a:t>i</a:t>
+                </a:r>
+                <a:r>
+                  <a:rPr lang="en-US" b="0" dirty="0"/>
+                  <a:t> = 1, 2, … , n</a:t>
+                </a:r>
+                <a:endParaRPr lang="en-US" dirty="0"/>
+              </a:p>
+              <a:p>
+                <a:pPr lvl="1"/>
+                <a14:m>
+                  <m:oMath xmlns:m="http://schemas.openxmlformats.org/officeDocument/2006/math">
+                    <m:sSub>
+                      <m:sSubPr>
+                        <m:ctrlPr>
+                          <a:rPr lang="en-US" i="1">
+                            <a:latin typeface="Cambria Math" panose="02040503050406030204" pitchFamily="18" charset="0"/>
+                          </a:rPr>
+                        </m:ctrlPr>
+                      </m:sSubPr>
+                      <m:e>
+                        <m:r>
+                          <a:rPr lang="en-US" i="1">
+                            <a:latin typeface="Cambria Math" panose="02040503050406030204" pitchFamily="18" charset="0"/>
+                          </a:rPr>
+                          <m:t>𝑦</m:t>
+                        </m:r>
+                      </m:e>
+                      <m:sub>
+                        <m:r>
+                          <a:rPr lang="en-US" i="1">
+                            <a:latin typeface="Cambria Math" panose="02040503050406030204" pitchFamily="18" charset="0"/>
+                          </a:rPr>
+                          <m:t>𝑖</m:t>
+                        </m:r>
+                      </m:sub>
+                    </m:sSub>
+                  </m:oMath>
+                </a14:m>
+                <a:r>
+                  <a:rPr lang="en-US" b="0" dirty="0"/>
+                  <a:t> : Predicted value (dependent variable)</a:t>
+                </a:r>
+              </a:p>
+              <a:p>
+                <a:pPr lvl="1"/>
+                <a14:m>
+                  <m:oMath xmlns:m="http://schemas.openxmlformats.org/officeDocument/2006/math">
+                    <m:sSub>
+                      <m:sSubPr>
+                        <m:ctrlPr>
+                          <a:rPr lang="en-US" i="1">
+                            <a:latin typeface="Cambria Math" panose="02040503050406030204" pitchFamily="18" charset="0"/>
+                          </a:rPr>
+                        </m:ctrlPr>
+                      </m:sSubPr>
+                      <m:e>
+                        <m:r>
+                          <a:rPr lang="en-US" i="1">
+                            <a:latin typeface="Cambria Math" panose="02040503050406030204" pitchFamily="18" charset="0"/>
+                          </a:rPr>
+                          <m:t>𝑋</m:t>
+                        </m:r>
+                      </m:e>
+                      <m:sub>
+                        <m:r>
+                          <a:rPr lang="en-US" i="1">
+                            <a:latin typeface="Cambria Math" panose="02040503050406030204" pitchFamily="18" charset="0"/>
+                          </a:rPr>
+                          <m:t>𝑖</m:t>
+                        </m:r>
+                        <m:r>
+                          <a:rPr lang="en-US" i="1">
+                            <a:latin typeface="Cambria Math" panose="02040503050406030204" pitchFamily="18" charset="0"/>
+                          </a:rPr>
+                          <m:t>1</m:t>
+                        </m:r>
+                      </m:sub>
+                    </m:sSub>
+                  </m:oMath>
+                </a14:m>
+                <a:r>
+                  <a:rPr lang="en-US" b="0" dirty="0"/>
+                  <a:t> through </a:t>
+                </a:r>
+                <a14:m>
+                  <m:oMath xmlns:m="http://schemas.openxmlformats.org/officeDocument/2006/math">
+                    <m:sSub>
+                      <m:sSubPr>
+                        <m:ctrlPr>
+                          <a:rPr lang="en-US" i="1">
+                            <a:latin typeface="Cambria Math" panose="02040503050406030204" pitchFamily="18" charset="0"/>
+                          </a:rPr>
+                        </m:ctrlPr>
+                      </m:sSubPr>
+                      <m:e>
+                        <m:r>
+                          <a:rPr lang="en-US" i="1">
+                            <a:latin typeface="Cambria Math" panose="02040503050406030204" pitchFamily="18" charset="0"/>
+                          </a:rPr>
+                          <m:t>𝑋</m:t>
+                        </m:r>
+                      </m:e>
+                      <m:sub>
+                        <m:r>
+                          <a:rPr lang="en-US" i="1">
+                            <a:latin typeface="Cambria Math" panose="02040503050406030204" pitchFamily="18" charset="0"/>
+                          </a:rPr>
+                          <m:t>𝑖𝑝</m:t>
+                        </m:r>
+                      </m:sub>
+                    </m:sSub>
+                  </m:oMath>
+                </a14:m>
+                <a:r>
+                  <a:rPr lang="en-US" b="0" dirty="0"/>
+                  <a:t> : p distinct independent variables</a:t>
+                </a:r>
+              </a:p>
+              <a:p>
+                <a:pPr lvl="1"/>
+                <a14:m>
+                  <m:oMath xmlns:m="http://schemas.openxmlformats.org/officeDocument/2006/math">
+                    <m:sSub>
+                      <m:sSubPr>
+                        <m:ctrlPr>
+                          <a:rPr lang="en-US" i="1">
+                            <a:latin typeface="Cambria Math" panose="02040503050406030204" pitchFamily="18" charset="0"/>
+                          </a:rPr>
+                        </m:ctrlPr>
+                      </m:sSubPr>
+                      <m:e>
+                        <m:r>
+                          <a:rPr lang="en-US" i="1">
+                            <a:latin typeface="Cambria Math" panose="02040503050406030204" pitchFamily="18" charset="0"/>
+                          </a:rPr>
+                          <m:t>𝑏</m:t>
+                        </m:r>
+                      </m:e>
+                      <m:sub>
+                        <m:r>
+                          <a:rPr lang="en-US" i="1">
+                            <a:latin typeface="Cambria Math" panose="02040503050406030204" pitchFamily="18" charset="0"/>
+                          </a:rPr>
+                          <m:t>0</m:t>
+                        </m:r>
+                      </m:sub>
+                    </m:sSub>
+                  </m:oMath>
+                </a14:m>
+                <a:r>
+                  <a:rPr lang="en-US" b="0" dirty="0"/>
+                  <a:t> : value of y when all the independent variables (</a:t>
+                </a:r>
+                <a14:m>
+                  <m:oMath xmlns:m="http://schemas.openxmlformats.org/officeDocument/2006/math">
+                    <m:sSub>
+                      <m:sSubPr>
+                        <m:ctrlPr>
+                          <a:rPr lang="en-US" i="1">
+                            <a:latin typeface="Cambria Math" panose="02040503050406030204" pitchFamily="18" charset="0"/>
+                          </a:rPr>
+                        </m:ctrlPr>
+                      </m:sSubPr>
+                      <m:e>
+                        <m:r>
+                          <a:rPr lang="en-US" i="1">
+                            <a:latin typeface="Cambria Math" panose="02040503050406030204" pitchFamily="18" charset="0"/>
+                          </a:rPr>
+                          <m:t>𝑋</m:t>
+                        </m:r>
+                      </m:e>
+                      <m:sub>
+                        <m:r>
+                          <a:rPr lang="en-US" i="1">
+                            <a:latin typeface="Cambria Math" panose="02040503050406030204" pitchFamily="18" charset="0"/>
+                          </a:rPr>
+                          <m:t>𝑖</m:t>
+                        </m:r>
+                        <m:r>
+                          <a:rPr lang="en-US" i="1">
+                            <a:latin typeface="Cambria Math" panose="02040503050406030204" pitchFamily="18" charset="0"/>
+                          </a:rPr>
+                          <m:t>1</m:t>
+                        </m:r>
+                      </m:sub>
+                    </m:sSub>
+                  </m:oMath>
+                </a14:m>
+                <a:r>
+                  <a:rPr lang="en-US" dirty="0"/>
+                  <a:t> through </a:t>
+                </a:r>
+                <a14:m>
+                  <m:oMath xmlns:m="http://schemas.openxmlformats.org/officeDocument/2006/math">
+                    <m:sSub>
+                      <m:sSubPr>
+                        <m:ctrlPr>
+                          <a:rPr lang="en-US" i="1">
+                            <a:latin typeface="Cambria Math" panose="02040503050406030204" pitchFamily="18" charset="0"/>
+                          </a:rPr>
+                        </m:ctrlPr>
+                      </m:sSubPr>
+                      <m:e>
+                        <m:r>
+                          <a:rPr lang="en-US" i="1">
+                            <a:latin typeface="Cambria Math" panose="02040503050406030204" pitchFamily="18" charset="0"/>
+                          </a:rPr>
+                          <m:t>𝑋</m:t>
+                        </m:r>
+                      </m:e>
+                      <m:sub>
+                        <m:r>
+                          <a:rPr lang="en-US" i="1">
+                            <a:latin typeface="Cambria Math" panose="02040503050406030204" pitchFamily="18" charset="0"/>
+                          </a:rPr>
+                          <m:t>𝑖𝑝</m:t>
+                        </m:r>
+                      </m:sub>
+                    </m:sSub>
+                  </m:oMath>
+                </a14:m>
+                <a:r>
+                  <a:rPr lang="en-US" b="0" dirty="0"/>
+                  <a:t>) are equal to zero</a:t>
+                </a:r>
+              </a:p>
+            </p:txBody>
+          </p:sp>
+        </mc:Choice>
+        <mc:Fallback>
+          <p:sp>
+            <p:nvSpPr>
+              <p:cNvPr id="3" name="Content Placeholder 2">
+                <a:extLst>
+                  <a:ext uri="{FF2B5EF4-FFF2-40B4-BE49-F238E27FC236}">
+                    <a16:creationId xmlns:a16="http://schemas.microsoft.com/office/drawing/2014/main" id="{2A4CDC7B-A586-664F-AB77-D3BA1F2BFB7D}"/>
+                  </a:ext>
+                </a:extLst>
+              </p:cNvPr>
+              <p:cNvSpPr>
+                <a:spLocks noGrp="1" noRot="1" noChangeAspect="1" noMove="1" noResize="1" noEditPoints="1" noAdjustHandles="1" noChangeArrowheads="1" noChangeShapeType="1" noTextEdit="1"/>
+              </p:cNvSpPr>
+              <p:nvPr>
+                <p:ph idx="1"/>
+              </p:nvPr>
+            </p:nvSpPr>
+            <p:spPr>
+              <a:blipFill>
+                <a:blip r:embed="rId2"/>
+                <a:stretch>
+                  <a:fillRect l="-144" t="-370" r="-862" b="-1852"/>
+                </a:stretch>
+              </a:blipFill>
+            </p:spPr>
+            <p:txBody>
+              <a:bodyPr/>
+              <a:lstStyle/>
+              <a:p>
+                <a:r>
+                  <a:rPr lang="en-US">
+                    <a:noFill/>
+                  </a:rPr>
+                  <a:t> </a:t>
+                </a:r>
+              </a:p>
+            </p:txBody>
+          </p:sp>
+        </mc:Fallback>
+      </mc:AlternateContent>
     </p:spTree>
     <p:extLst>
       <p:ext uri="{BB962C8B-B14F-4D97-AF65-F5344CB8AC3E}">
-        <p14:creationId xmlns:p14="http://schemas.microsoft.com/office/powerpoint/2010/main" val="1501488235"/>
+        <p14:creationId xmlns:p14="http://schemas.microsoft.com/office/powerpoint/2010/main" val="2197065774"/>
       </p:ext>
     </p:extLst>
   </p:cSld>
@@ -14507,7 +15821,13 @@
       </p:grpSpPr>
       <p:sp>
         <p:nvSpPr>
-          <p:cNvPr id="2" name="Title 1"/>
+          <p:cNvPr id="2" name="Title 1">
+            <a:extLst>
+              <a:ext uri="{FF2B5EF4-FFF2-40B4-BE49-F238E27FC236}">
+                <a16:creationId xmlns:a16="http://schemas.microsoft.com/office/drawing/2014/main" id="{B085AA6C-0143-B24A-86FE-48D66369EA67}"/>
+              </a:ext>
+            </a:extLst>
+          </p:cNvPr>
           <p:cNvSpPr>
             <a:spLocks noGrp="1"/>
           </p:cNvSpPr>
@@ -14522,14 +15842,21 @@
           <a:p>
             <a:r>
               <a:rPr lang="en-US" b="1" dirty="0"/>
-              <a:t>SAMPLE DATA (with random degradation)</a:t>
-            </a:r>
+              <a:t>ALGORITHM – DECISION TREE</a:t>
+            </a:r>
+            <a:endParaRPr lang="en-US" dirty="0"/>
           </a:p>
         </p:txBody>
       </p:sp>
       <p:sp>
         <p:nvSpPr>
-          <p:cNvPr id="5" name="Content Placeholder 4"/>
+          <p:cNvPr id="3" name="Content Placeholder 2">
+            <a:extLst>
+              <a:ext uri="{FF2B5EF4-FFF2-40B4-BE49-F238E27FC236}">
+                <a16:creationId xmlns:a16="http://schemas.microsoft.com/office/drawing/2014/main" id="{E0691099-0972-7F46-9D9D-23F3DE956190}"/>
+              </a:ext>
+            </a:extLst>
+          </p:cNvPr>
           <p:cNvSpPr>
             <a:spLocks noGrp="1"/>
           </p:cNvSpPr>
@@ -14539,47 +15866,41 @@
         </p:nvSpPr>
         <p:spPr/>
         <p:txBody>
-          <a:bodyPr/>
+          <a:bodyPr>
+            <a:normAutofit lnSpcReduction="10000"/>
+          </a:bodyPr>
           <a:lstStyle/>
           <a:p>
+            <a:r>
+              <a:rPr lang="en-IN" dirty="0"/>
+              <a:t>Decision tree builds regression models in the form of a tree structure. It breaks down a dataset into smaller and smaller subsets while at the same time an associated decision tree is incrementally developed. The final result is a tree with decision nodes and leaf nodes. </a:t>
+            </a:r>
+          </a:p>
+          <a:p>
+            <a:endParaRPr lang="en-IN" dirty="0"/>
+          </a:p>
+          <a:p>
+            <a:r>
+              <a:rPr lang="en-IN" dirty="0"/>
+              <a:t>A decision node has two or more branches, each representing values for the attribute tested. </a:t>
+            </a:r>
+          </a:p>
+          <a:p>
+            <a:endParaRPr lang="en-IN" dirty="0"/>
+          </a:p>
+          <a:p>
+            <a:r>
+              <a:rPr lang="en-IN" dirty="0"/>
+              <a:t>Leaf node represents a decision on the numerical target. The topmost decision node in a tree which corresponds to the best predictor called root node. </a:t>
+            </a:r>
             <a:endParaRPr lang="en-US" dirty="0"/>
           </a:p>
         </p:txBody>
       </p:sp>
-      <p:pic>
-        <p:nvPicPr>
-          <p:cNvPr id="3" name="Picture 2">
-            <a:extLst>
-              <a:ext uri="{FF2B5EF4-FFF2-40B4-BE49-F238E27FC236}">
-                <a16:creationId xmlns:a16="http://schemas.microsoft.com/office/drawing/2014/main" id="{F1AC9083-FEBC-8247-8C0A-BA0E2EC27611}"/>
-              </a:ext>
-            </a:extLst>
-          </p:cNvPr>
-          <p:cNvPicPr>
-            <a:picLocks noChangeAspect="1"/>
-          </p:cNvPicPr>
-          <p:nvPr/>
-        </p:nvPicPr>
-        <p:blipFill>
-          <a:blip r:embed="rId2"/>
-          <a:stretch>
-            <a:fillRect/>
-          </a:stretch>
-        </p:blipFill>
-        <p:spPr>
-          <a:xfrm>
-            <a:off x="1091033" y="2496645"/>
-            <a:ext cx="10028912" cy="3783958"/>
-          </a:xfrm>
-          <a:prstGeom prst="rect">
-            <a:avLst/>
-          </a:prstGeom>
-        </p:spPr>
-      </p:pic>
     </p:spTree>
     <p:extLst>
       <p:ext uri="{BB962C8B-B14F-4D97-AF65-F5344CB8AC3E}">
-        <p14:creationId xmlns:p14="http://schemas.microsoft.com/office/powerpoint/2010/main" val="724238803"/>
+        <p14:creationId xmlns:p14="http://schemas.microsoft.com/office/powerpoint/2010/main" val="488288750"/>
       </p:ext>
     </p:extLst>
   </p:cSld>
@@ -14608,7 +15929,13 @@
       </p:grpSpPr>
       <p:sp>
         <p:nvSpPr>
-          <p:cNvPr id="2" name="Title 1"/>
+          <p:cNvPr id="2" name="Title 1">
+            <a:extLst>
+              <a:ext uri="{FF2B5EF4-FFF2-40B4-BE49-F238E27FC236}">
+                <a16:creationId xmlns:a16="http://schemas.microsoft.com/office/drawing/2014/main" id="{57313890-4ABE-DC4A-B499-E4C278250698}"/>
+              </a:ext>
+            </a:extLst>
+          </p:cNvPr>
           <p:cNvSpPr>
             <a:spLocks noGrp="1"/>
           </p:cNvSpPr>
@@ -14623,17 +15950,18 @@
           <a:p>
             <a:r>
               <a:rPr lang="en-US" b="1" dirty="0"/>
-              <a:t>RESULTS (Multiple Linear Regression)</a:t>
-            </a:r>
+              <a:t>ALGORITHM – RANDOM FOREST</a:t>
+            </a:r>
+            <a:endParaRPr lang="en-US" dirty="0"/>
           </a:p>
         </p:txBody>
       </p:sp>
       <p:sp>
         <p:nvSpPr>
-          <p:cNvPr id="9" name="Content Placeholder 8">
+          <p:cNvPr id="3" name="Content Placeholder 2">
             <a:extLst>
               <a:ext uri="{FF2B5EF4-FFF2-40B4-BE49-F238E27FC236}">
-                <a16:creationId xmlns:a16="http://schemas.microsoft.com/office/drawing/2014/main" id="{99109DF5-D3FB-C442-87A3-69151362FE4F}"/>
+                <a16:creationId xmlns:a16="http://schemas.microsoft.com/office/drawing/2014/main" id="{262EA3B4-0916-D940-898A-29FE11E72B49}"/>
               </a:ext>
             </a:extLst>
           </p:cNvPr>
@@ -14646,47 +15974,99 @@
         </p:nvSpPr>
         <p:spPr/>
         <p:txBody>
-          <a:bodyPr/>
+          <a:bodyPr>
+            <a:normAutofit/>
+          </a:bodyPr>
           <a:lstStyle/>
           <a:p>
-            <a:endParaRPr lang="en-US"/>
+            <a:endParaRPr lang="en-IN" dirty="0"/>
+          </a:p>
+          <a:p>
+            <a:endParaRPr lang="en-IN" dirty="0"/>
+          </a:p>
+          <a:p>
+            <a:r>
+              <a:rPr lang="en-IN" dirty="0"/>
+              <a:t>The Random Forest Regression is a type of Machine Learning Algorithm that makes predictions by combining decisions from a sequence of base models. More formally we can write this class of models as:				   </a:t>
+            </a:r>
+          </a:p>
+          <a:p>
+            <a:pPr marL="0" indent="0">
+              <a:buNone/>
+            </a:pPr>
+            <a:r>
+              <a:rPr lang="en-IN" i="1" dirty="0"/>
+              <a:t>	g(x) = f</a:t>
+            </a:r>
+            <a:r>
+              <a:rPr lang="en-IN" i="1" baseline="-25000" dirty="0"/>
+              <a:t>0</a:t>
+            </a:r>
+            <a:r>
+              <a:rPr lang="en-IN" i="1" dirty="0"/>
+              <a:t>(x) + f</a:t>
+            </a:r>
+            <a:r>
+              <a:rPr lang="en-IN" i="1" baseline="-25000" dirty="0"/>
+              <a:t>1</a:t>
+            </a:r>
+            <a:r>
+              <a:rPr lang="en-IN" i="1" dirty="0"/>
+              <a:t>(x) + f</a:t>
+            </a:r>
+            <a:r>
+              <a:rPr lang="en-IN" i="1" baseline="-25000" dirty="0"/>
+              <a:t>2</a:t>
+            </a:r>
+            <a:r>
+              <a:rPr lang="en-IN" i="1" dirty="0"/>
+              <a:t>(x) + …</a:t>
+            </a:r>
+          </a:p>
+          <a:p>
+            <a:pPr marL="0" indent="0">
+              <a:buNone/>
+            </a:pPr>
+            <a:r>
+              <a:rPr lang="en-IN" sz="1800" i="1" dirty="0"/>
+              <a:t>     </a:t>
+            </a:r>
+            <a:r>
+              <a:rPr lang="en-IN" sz="1800" dirty="0"/>
+              <a:t>where the final model </a:t>
+            </a:r>
+            <a:r>
+              <a:rPr lang="en-IN" sz="1800" i="1" dirty="0"/>
+              <a:t>g</a:t>
+            </a:r>
+            <a:r>
+              <a:rPr lang="en-IN" sz="1800" dirty="0"/>
+              <a:t> is the sum of si</a:t>
+            </a:r>
+            <a:r>
+              <a:rPr lang="en-IN" dirty="0"/>
+              <a:t>mple base models </a:t>
+            </a:r>
+            <a:r>
+              <a:rPr lang="en-IN" i="1" dirty="0"/>
+              <a:t>f</a:t>
+            </a:r>
+            <a:r>
+              <a:rPr lang="en-IN" i="1" baseline="-25000" dirty="0"/>
+              <a:t>i</a:t>
+            </a:r>
+            <a:r>
+              <a:rPr lang="en-IN" dirty="0"/>
+              <a:t>. Here, each 	base classifier is a simple Decision Tree.</a:t>
+            </a:r>
+            <a:endParaRPr lang="en-IN" sz="1800" dirty="0"/>
           </a:p>
         </p:txBody>
       </p:sp>
-      <p:pic>
-        <p:nvPicPr>
-          <p:cNvPr id="10" name="Picture 9">
-            <a:extLst>
-              <a:ext uri="{FF2B5EF4-FFF2-40B4-BE49-F238E27FC236}">
-                <a16:creationId xmlns:a16="http://schemas.microsoft.com/office/drawing/2014/main" id="{19D14794-8909-6346-BE89-B735451CD721}"/>
-              </a:ext>
-            </a:extLst>
-          </p:cNvPr>
-          <p:cNvPicPr>
-            <a:picLocks noChangeAspect="1"/>
-          </p:cNvPicPr>
-          <p:nvPr/>
-        </p:nvPicPr>
-        <p:blipFill>
-          <a:blip r:embed="rId2"/>
-          <a:stretch>
-            <a:fillRect/>
-          </a:stretch>
-        </p:blipFill>
-        <p:spPr>
-          <a:xfrm>
-            <a:off x="2118567" y="2257316"/>
-            <a:ext cx="7797800" cy="4508500"/>
-          </a:xfrm>
-          <a:prstGeom prst="rect">
-            <a:avLst/>
-          </a:prstGeom>
-        </p:spPr>
-      </p:pic>
     </p:spTree>
     <p:extLst>
       <p:ext uri="{BB962C8B-B14F-4D97-AF65-F5344CB8AC3E}">
-        <p14:creationId xmlns:p14="http://schemas.microsoft.com/office/powerpoint/2010/main" val="800801358"/>
+        <p14:creationId xmlns:p14="http://schemas.microsoft.com/office/powerpoint/2010/main" val="2798466210"/>
       </p:ext>
     </p:extLst>
   </p:cSld>

</xml_diff>

<commit_message>
updated ppt and report
</commit_message>
<xml_diff>
--- a/docs/ectm_presentation.pptx
+++ b/docs/ectm_presentation.pptx
@@ -464,7 +464,7 @@
           <a:p>
             <a:fld id="{816CF061-B839-684F-8095-B57E1AB6999C}" type="datetimeFigureOut">
               <a:rPr lang="en-US" smtClean="0"/>
-              <a:t>7/20/18</a:t>
+              <a:t>7/26/18</a:t>
             </a:fld>
             <a:endParaRPr lang="en-US"/>
           </a:p>
@@ -1557,7 +1557,7 @@
           <a:p>
             <a:fld id="{816CF061-B839-684F-8095-B57E1AB6999C}" type="datetimeFigureOut">
               <a:rPr lang="en-US" smtClean="0"/>
-              <a:t>7/20/18</a:t>
+              <a:t>7/26/18</a:t>
             </a:fld>
             <a:endParaRPr lang="en-US"/>
           </a:p>
@@ -2537,7 +2537,7 @@
           <a:p>
             <a:fld id="{816CF061-B839-684F-8095-B57E1AB6999C}" type="datetimeFigureOut">
               <a:rPr lang="en-US" smtClean="0"/>
-              <a:t>7/20/18</a:t>
+              <a:t>7/26/18</a:t>
             </a:fld>
             <a:endParaRPr lang="en-US"/>
           </a:p>
@@ -3671,7 +3671,7 @@
           <a:p>
             <a:fld id="{816CF061-B839-684F-8095-B57E1AB6999C}" type="datetimeFigureOut">
               <a:rPr lang="en-US" smtClean="0"/>
-              <a:t>7/20/18</a:t>
+              <a:t>7/26/18</a:t>
             </a:fld>
             <a:endParaRPr lang="en-US"/>
           </a:p>
@@ -4704,7 +4704,7 @@
           <a:p>
             <a:fld id="{816CF061-B839-684F-8095-B57E1AB6999C}" type="datetimeFigureOut">
               <a:rPr lang="en-US" smtClean="0"/>
-              <a:t>7/20/18</a:t>
+              <a:t>7/26/18</a:t>
             </a:fld>
             <a:endParaRPr lang="en-US"/>
           </a:p>
@@ -5364,7 +5364,7 @@
           <a:p>
             <a:fld id="{816CF061-B839-684F-8095-B57E1AB6999C}" type="datetimeFigureOut">
               <a:rPr lang="en-US" smtClean="0"/>
-              <a:t>7/20/18</a:t>
+              <a:t>7/26/18</a:t>
             </a:fld>
             <a:endParaRPr lang="en-US"/>
           </a:p>
@@ -6225,7 +6225,7 @@
           <a:p>
             <a:fld id="{816CF061-B839-684F-8095-B57E1AB6999C}" type="datetimeFigureOut">
               <a:rPr lang="en-US" smtClean="0"/>
-              <a:t>7/20/18</a:t>
+              <a:t>7/26/18</a:t>
             </a:fld>
             <a:endParaRPr lang="en-US"/>
           </a:p>
@@ -6415,7 +6415,7 @@
           <a:p>
             <a:fld id="{816CF061-B839-684F-8095-B57E1AB6999C}" type="datetimeFigureOut">
               <a:rPr lang="en-US" smtClean="0"/>
-              <a:t>7/20/18</a:t>
+              <a:t>7/26/18</a:t>
             </a:fld>
             <a:endParaRPr lang="en-US"/>
           </a:p>
@@ -7387,7 +7387,7 @@
           <a:p>
             <a:fld id="{816CF061-B839-684F-8095-B57E1AB6999C}" type="datetimeFigureOut">
               <a:rPr lang="en-US" smtClean="0"/>
-              <a:t>7/20/18</a:t>
+              <a:t>7/26/18</a:t>
             </a:fld>
             <a:endParaRPr lang="en-US"/>
           </a:p>
@@ -7603,7 +7603,7 @@
           <a:p>
             <a:fld id="{816CF061-B839-684F-8095-B57E1AB6999C}" type="datetimeFigureOut">
               <a:rPr lang="en-US" smtClean="0"/>
-              <a:t>7/20/18</a:t>
+              <a:t>7/26/18</a:t>
             </a:fld>
             <a:endParaRPr lang="en-US"/>
           </a:p>
@@ -8637,7 +8637,7 @@
           <a:p>
             <a:fld id="{816CF061-B839-684F-8095-B57E1AB6999C}" type="datetimeFigureOut">
               <a:rPr lang="en-US" smtClean="0"/>
-              <a:t>7/20/18</a:t>
+              <a:t>7/26/18</a:t>
             </a:fld>
             <a:endParaRPr lang="en-US"/>
           </a:p>
@@ -8914,7 +8914,7 @@
           <a:p>
             <a:fld id="{816CF061-B839-684F-8095-B57E1AB6999C}" type="datetimeFigureOut">
               <a:rPr lang="en-US" smtClean="0"/>
-              <a:t>7/20/18</a:t>
+              <a:t>7/26/18</a:t>
             </a:fld>
             <a:endParaRPr lang="en-US"/>
           </a:p>
@@ -9329,7 +9329,7 @@
           <a:p>
             <a:fld id="{816CF061-B839-684F-8095-B57E1AB6999C}" type="datetimeFigureOut">
               <a:rPr lang="en-US" smtClean="0"/>
-              <a:t>7/20/18</a:t>
+              <a:t>7/26/18</a:t>
             </a:fld>
             <a:endParaRPr lang="en-US"/>
           </a:p>
@@ -9461,7 +9461,7 @@
           <a:p>
             <a:fld id="{816CF061-B839-684F-8095-B57E1AB6999C}" type="datetimeFigureOut">
               <a:rPr lang="en-US" smtClean="0"/>
-              <a:t>7/20/18</a:t>
+              <a:t>7/26/18</a:t>
             </a:fld>
             <a:endParaRPr lang="en-US"/>
           </a:p>
@@ -9556,7 +9556,7 @@
           <a:p>
             <a:fld id="{816CF061-B839-684F-8095-B57E1AB6999C}" type="datetimeFigureOut">
               <a:rPr lang="en-US" smtClean="0"/>
-              <a:t>7/20/18</a:t>
+              <a:t>7/26/18</a:t>
             </a:fld>
             <a:endParaRPr lang="en-US"/>
           </a:p>
@@ -10642,7 +10642,7 @@
           <a:p>
             <a:fld id="{816CF061-B839-684F-8095-B57E1AB6999C}" type="datetimeFigureOut">
               <a:rPr lang="en-US" smtClean="0"/>
-              <a:t>7/20/18</a:t>
+              <a:t>7/26/18</a:t>
             </a:fld>
             <a:endParaRPr lang="en-US"/>
           </a:p>
@@ -11755,7 +11755,7 @@
           <a:p>
             <a:fld id="{816CF061-B839-684F-8095-B57E1AB6999C}" type="datetimeFigureOut">
               <a:rPr lang="en-US" smtClean="0"/>
-              <a:t>7/20/18</a:t>
+              <a:t>7/26/18</a:t>
             </a:fld>
             <a:endParaRPr lang="en-US"/>
           </a:p>
@@ -12752,7 +12752,7 @@
           <a:p>
             <a:fld id="{816CF061-B839-684F-8095-B57E1AB6999C}" type="datetimeFigureOut">
               <a:rPr lang="en-US" smtClean="0"/>
-              <a:t>7/20/18</a:t>
+              <a:t>7/26/18</a:t>
             </a:fld>
             <a:endParaRPr lang="en-US"/>
           </a:p>
@@ -13778,44 +13778,21 @@
           </a:p>
         </p:txBody>
       </p:sp>
-      <p:sp>
-        <p:nvSpPr>
-          <p:cNvPr id="9" name="Content Placeholder 8">
+      <p:pic>
+        <p:nvPicPr>
+          <p:cNvPr id="6" name="Content Placeholder 5">
             <a:extLst>
               <a:ext uri="{FF2B5EF4-FFF2-40B4-BE49-F238E27FC236}">
-                <a16:creationId xmlns:a16="http://schemas.microsoft.com/office/drawing/2014/main" id="{99109DF5-D3FB-C442-87A3-69151362FE4F}"/>
-              </a:ext>
-            </a:extLst>
-          </p:cNvPr>
-          <p:cNvSpPr>
-            <a:spLocks noGrp="1"/>
-          </p:cNvSpPr>
-          <p:nvPr>
-            <p:ph idx="1"/>
-          </p:nvPr>
-        </p:nvSpPr>
-        <p:spPr/>
-        <p:txBody>
-          <a:bodyPr/>
-          <a:lstStyle/>
-          <a:p>
-            <a:endParaRPr lang="en-US" dirty="0"/>
-          </a:p>
-        </p:txBody>
-      </p:sp>
-      <p:pic>
-        <p:nvPicPr>
-          <p:cNvPr id="10" name="Picture 9">
-            <a:extLst>
-              <a:ext uri="{FF2B5EF4-FFF2-40B4-BE49-F238E27FC236}">
-                <a16:creationId xmlns:a16="http://schemas.microsoft.com/office/drawing/2014/main" id="{19D14794-8909-6346-BE89-B735451CD721}"/>
+                <a16:creationId xmlns:a16="http://schemas.microsoft.com/office/drawing/2014/main" id="{18B680F8-BC96-A843-A222-56701F59F7D4}"/>
               </a:ext>
             </a:extLst>
           </p:cNvPr>
           <p:cNvPicPr>
-            <a:picLocks noChangeAspect="1"/>
+            <a:picLocks noGrp="1" noChangeAspect="1"/>
           </p:cNvPicPr>
-          <p:nvPr/>
+          <p:nvPr>
+            <p:ph idx="1"/>
+          </p:nvPr>
         </p:nvPicPr>
         <p:blipFill>
           <a:blip r:embed="rId2"/>
@@ -13825,12 +13802,9 @@
         </p:blipFill>
         <p:spPr>
           <a:xfrm>
-            <a:off x="2118567" y="2257316"/>
-            <a:ext cx="7797800" cy="4508500"/>
+            <a:off x="1686294" y="2290800"/>
+            <a:ext cx="8359750" cy="4567200"/>
           </a:xfrm>
-          <a:prstGeom prst="rect">
-            <a:avLst/>
-          </a:prstGeom>
         </p:spPr>
       </p:pic>
     </p:spTree>
@@ -13885,47 +13859,21 @@
           </a:p>
         </p:txBody>
       </p:sp>
-      <p:sp>
-        <p:nvSpPr>
-          <p:cNvPr id="5" name="Content Placeholder 4">
+      <p:pic>
+        <p:nvPicPr>
+          <p:cNvPr id="4" name="Content Placeholder 3">
             <a:extLst>
               <a:ext uri="{FF2B5EF4-FFF2-40B4-BE49-F238E27FC236}">
-                <a16:creationId xmlns:a16="http://schemas.microsoft.com/office/drawing/2014/main" id="{2FC32E8F-7542-D143-8CFA-6EAE4F02A435}"/>
-              </a:ext>
-            </a:extLst>
-          </p:cNvPr>
-          <p:cNvSpPr>
-            <a:spLocks noGrp="1"/>
-          </p:cNvSpPr>
-          <p:nvPr>
-            <p:ph idx="1"/>
-          </p:nvPr>
-        </p:nvSpPr>
-        <p:spPr/>
-        <p:txBody>
-          <a:bodyPr/>
-          <a:lstStyle/>
-          <a:p>
-            <a:pPr marL="0" indent="0">
-              <a:buNone/>
-            </a:pPr>
-            <a:endParaRPr lang="en-US" dirty="0"/>
-          </a:p>
-        </p:txBody>
-      </p:sp>
-      <p:pic>
-        <p:nvPicPr>
-          <p:cNvPr id="6" name="Picture 5">
-            <a:extLst>
-              <a:ext uri="{FF2B5EF4-FFF2-40B4-BE49-F238E27FC236}">
-                <a16:creationId xmlns:a16="http://schemas.microsoft.com/office/drawing/2014/main" id="{BFF2363B-FCA3-704A-9FB4-499627355CFA}"/>
+                <a16:creationId xmlns:a16="http://schemas.microsoft.com/office/drawing/2014/main" id="{B19EEBF6-E70E-5E45-9888-4FA2CB938469}"/>
               </a:ext>
             </a:extLst>
           </p:cNvPr>
           <p:cNvPicPr>
-            <a:picLocks noChangeAspect="1"/>
+            <a:picLocks noGrp="1" noChangeAspect="1"/>
           </p:cNvPicPr>
-          <p:nvPr/>
+          <p:nvPr>
+            <p:ph idx="1"/>
+          </p:nvPr>
         </p:nvPicPr>
         <p:blipFill>
           <a:blip r:embed="rId2"/>
@@ -13935,12 +13883,9 @@
         </p:blipFill>
         <p:spPr>
           <a:xfrm>
-            <a:off x="2157413" y="2282715"/>
-            <a:ext cx="7823200" cy="4457700"/>
+            <a:off x="1711009" y="2257047"/>
+            <a:ext cx="8421532" cy="4600953"/>
           </a:xfrm>
-          <a:prstGeom prst="rect">
-            <a:avLst/>
-          </a:prstGeom>
         </p:spPr>
       </p:pic>
     </p:spTree>
@@ -14001,44 +13946,21 @@
           </a:p>
         </p:txBody>
       </p:sp>
-      <p:sp>
-        <p:nvSpPr>
-          <p:cNvPr id="7" name="Content Placeholder 6">
+      <p:pic>
+        <p:nvPicPr>
+          <p:cNvPr id="4" name="Content Placeholder 3">
             <a:extLst>
               <a:ext uri="{FF2B5EF4-FFF2-40B4-BE49-F238E27FC236}">
-                <a16:creationId xmlns:a16="http://schemas.microsoft.com/office/drawing/2014/main" id="{C8900252-8FCF-C84F-90A9-789B1309EE94}"/>
-              </a:ext>
-            </a:extLst>
-          </p:cNvPr>
-          <p:cNvSpPr>
-            <a:spLocks noGrp="1"/>
-          </p:cNvSpPr>
-          <p:nvPr>
-            <p:ph idx="1"/>
-          </p:nvPr>
-        </p:nvSpPr>
-        <p:spPr/>
-        <p:txBody>
-          <a:bodyPr/>
-          <a:lstStyle/>
-          <a:p>
-            <a:endParaRPr lang="en-US"/>
-          </a:p>
-        </p:txBody>
-      </p:sp>
-      <p:pic>
-        <p:nvPicPr>
-          <p:cNvPr id="8" name="Picture 7">
-            <a:extLst>
-              <a:ext uri="{FF2B5EF4-FFF2-40B4-BE49-F238E27FC236}">
-                <a16:creationId xmlns:a16="http://schemas.microsoft.com/office/drawing/2014/main" id="{7BA06E8F-877D-5646-B61D-55077A9FC6FA}"/>
+                <a16:creationId xmlns:a16="http://schemas.microsoft.com/office/drawing/2014/main" id="{7AC34F7A-5091-154E-A3EF-FB166FDA29AE}"/>
               </a:ext>
             </a:extLst>
           </p:cNvPr>
           <p:cNvPicPr>
-            <a:picLocks noChangeAspect="1"/>
+            <a:picLocks noGrp="1" noChangeAspect="1"/>
           </p:cNvPicPr>
-          <p:nvPr/>
+          <p:nvPr>
+            <p:ph idx="1"/>
+          </p:nvPr>
         </p:nvPicPr>
         <p:blipFill>
           <a:blip r:embed="rId2"/>
@@ -14048,12 +13970,9 @@
         </p:blipFill>
         <p:spPr>
           <a:xfrm>
-            <a:off x="2068513" y="2374900"/>
-            <a:ext cx="7912100" cy="4483100"/>
+            <a:off x="1934950" y="2291632"/>
+            <a:ext cx="8358227" cy="4566368"/>
           </a:xfrm>
-          <a:prstGeom prst="rect">
-            <a:avLst/>
-          </a:prstGeom>
         </p:spPr>
       </p:pic>
     </p:spTree>
@@ -15161,7 +15080,15 @@
           <a:p>
             <a:r>
               <a:rPr lang="en-US" dirty="0"/>
-              <a:t>Results of all these algorithms are compared by computing the R2 Score</a:t>
+              <a:t>Results of all these algorithms are compared by computing the R</a:t>
+            </a:r>
+            <a:r>
+              <a:rPr lang="en-US" baseline="30000" dirty="0"/>
+              <a:t>2</a:t>
+            </a:r>
+            <a:r>
+              <a:rPr lang="en-US" dirty="0"/>
+              <a:t> Score</a:t>
             </a:r>
           </a:p>
           <a:p>
@@ -15227,8 +15154,8 @@
           </a:p>
         </p:txBody>
       </p:sp>
-      <mc:AlternateContent xmlns:mc="http://schemas.openxmlformats.org/markup-compatibility/2006">
-        <mc:Choice xmlns:a14="http://schemas.microsoft.com/office/drawing/2010/main" Requires="a14">
+      <mc:AlternateContent xmlns:mc="http://schemas.openxmlformats.org/markup-compatibility/2006" xmlns:a14="http://schemas.microsoft.com/office/drawing/2010/main">
+        <mc:Choice Requires="a14">
           <p:sp>
             <p:nvSpPr>
               <p:cNvPr id="3" name="Content Placeholder 2">
@@ -15749,7 +15676,7 @@
             </p:txBody>
           </p:sp>
         </mc:Choice>
-        <mc:Fallback>
+        <mc:Fallback xmlns="">
           <p:sp>
             <p:nvSpPr>
               <p:cNvPr id="3" name="Content Placeholder 2">

</xml_diff>